<commit_message>
Changed hyperlink color to a more clear color
</commit_message>
<xml_diff>
--- a/Workshop 4: Polynomial Regression/Presentation.pptx
+++ b/Workshop 4: Polynomial Regression/Presentation.pptx
@@ -2801,7 +2801,7 @@
           <a:noFill/>
           <a:extLst>
             <a:ext uri="{909E8E84-426E-40dd-AFC4-6F175D3DCCD1}">
-              <a14:hiddenFill xmlns:a14="http://schemas.microsoft.com/office/drawing/2010/main" xmlns="">
+              <a14:hiddenFill xmlns="" xmlns:a14="http://schemas.microsoft.com/office/drawing/2010/main">
                 <a:solidFill>
                   <a:srgbClr val="FFFFFF"/>
                 </a:solidFill>
@@ -2861,7 +2861,7 @@
             </a:ln>
             <a:extLst>
               <a:ext uri="{91240B29-F687-4f45-9708-019B960494DF}">
-                <a14:hiddenLine xmlns:a14="http://schemas.microsoft.com/office/drawing/2010/main" xmlns="" w="9525">
+                <a14:hiddenLine xmlns="" xmlns:a14="http://schemas.microsoft.com/office/drawing/2010/main" w="9525">
                   <a:solidFill>
                     <a:srgbClr val="000000"/>
                   </a:solidFill>
@@ -2951,7 +2951,7 @@
             </a:ln>
             <a:extLst>
               <a:ext uri="{91240B29-F687-4f45-9708-019B960494DF}">
-                <a14:hiddenLine xmlns:a14="http://schemas.microsoft.com/office/drawing/2010/main" xmlns="" w="9525">
+                <a14:hiddenLine xmlns="" xmlns:a14="http://schemas.microsoft.com/office/drawing/2010/main" w="9525">
                   <a:solidFill>
                     <a:srgbClr val="000000"/>
                   </a:solidFill>
@@ -3041,7 +3041,7 @@
             </a:ln>
             <a:extLst>
               <a:ext uri="{91240B29-F687-4f45-9708-019B960494DF}">
-                <a14:hiddenLine xmlns:a14="http://schemas.microsoft.com/office/drawing/2010/main" xmlns="" w="9525">
+                <a14:hiddenLine xmlns="" xmlns:a14="http://schemas.microsoft.com/office/drawing/2010/main" w="9525">
                   <a:solidFill>
                     <a:srgbClr val="000000"/>
                   </a:solidFill>
@@ -3075,7 +3075,7 @@
             </a:ln>
             <a:extLst>
               <a:ext uri="{91240B29-F687-4f45-9708-019B960494DF}">
-                <a14:hiddenLine xmlns:a14="http://schemas.microsoft.com/office/drawing/2010/main" xmlns="" w="9525">
+                <a14:hiddenLine xmlns="" xmlns:a14="http://schemas.microsoft.com/office/drawing/2010/main" w="9525">
                   <a:solidFill>
                     <a:srgbClr val="000000"/>
                   </a:solidFill>
@@ -3165,7 +3165,7 @@
             </a:ln>
             <a:extLst>
               <a:ext uri="{91240B29-F687-4f45-9708-019B960494DF}">
-                <a14:hiddenLine xmlns:a14="http://schemas.microsoft.com/office/drawing/2010/main" xmlns="" w="9525">
+                <a14:hiddenLine xmlns="" xmlns:a14="http://schemas.microsoft.com/office/drawing/2010/main" w="9525">
                   <a:solidFill>
                     <a:srgbClr val="000000"/>
                   </a:solidFill>
@@ -3227,7 +3227,7 @@
             </a:ln>
             <a:extLst>
               <a:ext uri="{91240B29-F687-4f45-9708-019B960494DF}">
-                <a14:hiddenLine xmlns:a14="http://schemas.microsoft.com/office/drawing/2010/main" xmlns="" w="9525">
+                <a14:hiddenLine xmlns="" xmlns:a14="http://schemas.microsoft.com/office/drawing/2010/main" w="9525">
                   <a:solidFill>
                     <a:srgbClr val="000000"/>
                   </a:solidFill>
@@ -3289,7 +3289,7 @@
             </a:ln>
             <a:extLst>
               <a:ext uri="{91240B29-F687-4f45-9708-019B960494DF}">
-                <a14:hiddenLine xmlns:a14="http://schemas.microsoft.com/office/drawing/2010/main" xmlns="" w="9525">
+                <a14:hiddenLine xmlns="" xmlns:a14="http://schemas.microsoft.com/office/drawing/2010/main" w="9525">
                   <a:solidFill>
                     <a:srgbClr val="000000"/>
                   </a:solidFill>
@@ -3379,7 +3379,7 @@
             </a:ln>
             <a:extLst>
               <a:ext uri="{91240B29-F687-4f45-9708-019B960494DF}">
-                <a14:hiddenLine xmlns:a14="http://schemas.microsoft.com/office/drawing/2010/main" xmlns="" w="9525">
+                <a14:hiddenLine xmlns="" xmlns:a14="http://schemas.microsoft.com/office/drawing/2010/main" w="9525">
                   <a:solidFill>
                     <a:srgbClr val="000000"/>
                   </a:solidFill>
@@ -3441,7 +3441,7 @@
             </a:ln>
             <a:extLst>
               <a:ext uri="{91240B29-F687-4f45-9708-019B960494DF}">
-                <a14:hiddenLine xmlns:a14="http://schemas.microsoft.com/office/drawing/2010/main" xmlns="" w="9525">
+                <a14:hiddenLine xmlns="" xmlns:a14="http://schemas.microsoft.com/office/drawing/2010/main" w="9525">
                   <a:solidFill>
                     <a:srgbClr val="000000"/>
                   </a:solidFill>
@@ -3503,7 +3503,7 @@
             </a:ln>
             <a:extLst>
               <a:ext uri="{91240B29-F687-4f45-9708-019B960494DF}">
-                <a14:hiddenLine xmlns:a14="http://schemas.microsoft.com/office/drawing/2010/main" xmlns="" w="9525">
+                <a14:hiddenLine xmlns="" xmlns:a14="http://schemas.microsoft.com/office/drawing/2010/main" w="9525">
                   <a:solidFill>
                     <a:srgbClr val="000000"/>
                   </a:solidFill>
@@ -3593,7 +3593,7 @@
             </a:ln>
             <a:extLst>
               <a:ext uri="{91240B29-F687-4f45-9708-019B960494DF}">
-                <a14:hiddenLine xmlns:a14="http://schemas.microsoft.com/office/drawing/2010/main" xmlns="" w="9525">
+                <a14:hiddenLine xmlns="" xmlns:a14="http://schemas.microsoft.com/office/drawing/2010/main" w="9525">
                   <a:solidFill>
                     <a:srgbClr val="000000"/>
                   </a:solidFill>
@@ -3683,7 +3683,7 @@
             </a:ln>
             <a:extLst>
               <a:ext uri="{91240B29-F687-4f45-9708-019B960494DF}">
-                <a14:hiddenLine xmlns:a14="http://schemas.microsoft.com/office/drawing/2010/main" xmlns="" w="9525">
+                <a14:hiddenLine xmlns="" xmlns:a14="http://schemas.microsoft.com/office/drawing/2010/main" w="9525">
                   <a:solidFill>
                     <a:srgbClr val="000000"/>
                   </a:solidFill>
@@ -3745,7 +3745,7 @@
             </a:ln>
             <a:extLst>
               <a:ext uri="{91240B29-F687-4f45-9708-019B960494DF}">
-                <a14:hiddenLine xmlns:a14="http://schemas.microsoft.com/office/drawing/2010/main" xmlns="" w="9525">
+                <a14:hiddenLine xmlns="" xmlns:a14="http://schemas.microsoft.com/office/drawing/2010/main" w="9525">
                   <a:solidFill>
                     <a:srgbClr val="000000"/>
                   </a:solidFill>
@@ -3855,7 +3855,7 @@
             </a:ln>
             <a:extLst>
               <a:ext uri="{91240B29-F687-4f45-9708-019B960494DF}">
-                <a14:hiddenLine xmlns:a14="http://schemas.microsoft.com/office/drawing/2010/main" xmlns="" w="9525">
+                <a14:hiddenLine xmlns="" xmlns:a14="http://schemas.microsoft.com/office/drawing/2010/main" w="9525">
                   <a:solidFill>
                     <a:srgbClr val="000000"/>
                   </a:solidFill>
@@ -3917,7 +3917,7 @@
             </a:ln>
             <a:extLst>
               <a:ext uri="{91240B29-F687-4f45-9708-019B960494DF}">
-                <a14:hiddenLine xmlns:a14="http://schemas.microsoft.com/office/drawing/2010/main" xmlns="" w="9525">
+                <a14:hiddenLine xmlns="" xmlns:a14="http://schemas.microsoft.com/office/drawing/2010/main" w="9525">
                   <a:solidFill>
                     <a:srgbClr val="000000"/>
                   </a:solidFill>
@@ -4007,7 +4007,7 @@
             </a:ln>
             <a:extLst>
               <a:ext uri="{91240B29-F687-4f45-9708-019B960494DF}">
-                <a14:hiddenLine xmlns:a14="http://schemas.microsoft.com/office/drawing/2010/main" xmlns="" w="9525">
+                <a14:hiddenLine xmlns="" xmlns:a14="http://schemas.microsoft.com/office/drawing/2010/main" w="9525">
                   <a:solidFill>
                     <a:srgbClr val="000000"/>
                   </a:solidFill>
@@ -4097,7 +4097,7 @@
             </a:ln>
             <a:extLst>
               <a:ext uri="{91240B29-F687-4f45-9708-019B960494DF}">
-                <a14:hiddenLine xmlns:a14="http://schemas.microsoft.com/office/drawing/2010/main" xmlns="" w="9525">
+                <a14:hiddenLine xmlns="" xmlns:a14="http://schemas.microsoft.com/office/drawing/2010/main" w="9525">
                   <a:solidFill>
                     <a:srgbClr val="000000"/>
                   </a:solidFill>
@@ -4159,7 +4159,7 @@
             </a:ln>
             <a:extLst>
               <a:ext uri="{91240B29-F687-4f45-9708-019B960494DF}">
-                <a14:hiddenLine xmlns:a14="http://schemas.microsoft.com/office/drawing/2010/main" xmlns="" w="9525">
+                <a14:hiddenLine xmlns="" xmlns:a14="http://schemas.microsoft.com/office/drawing/2010/main" w="9525">
                   <a:solidFill>
                     <a:srgbClr val="000000"/>
                   </a:solidFill>
@@ -4249,7 +4249,7 @@
             </a:ln>
             <a:extLst>
               <a:ext uri="{91240B29-F687-4f45-9708-019B960494DF}">
-                <a14:hiddenLine xmlns:a14="http://schemas.microsoft.com/office/drawing/2010/main" xmlns="" w="9525">
+                <a14:hiddenLine xmlns="" xmlns:a14="http://schemas.microsoft.com/office/drawing/2010/main" w="9525">
                   <a:solidFill>
                     <a:srgbClr val="000000"/>
                   </a:solidFill>
@@ -4339,7 +4339,7 @@
             </a:ln>
             <a:extLst>
               <a:ext uri="{91240B29-F687-4f45-9708-019B960494DF}">
-                <a14:hiddenLine xmlns:a14="http://schemas.microsoft.com/office/drawing/2010/main" xmlns="" w="9525">
+                <a14:hiddenLine xmlns="" xmlns:a14="http://schemas.microsoft.com/office/drawing/2010/main" w="9525">
                   <a:solidFill>
                     <a:srgbClr val="000000"/>
                   </a:solidFill>
@@ -4395,7 +4395,7 @@
             </a:ln>
             <a:extLst>
               <a:ext uri="{91240B29-F687-4f45-9708-019B960494DF}">
-                <a14:hiddenLine xmlns:a14="http://schemas.microsoft.com/office/drawing/2010/main" xmlns="" w="9525">
+                <a14:hiddenLine xmlns="" xmlns:a14="http://schemas.microsoft.com/office/drawing/2010/main" w="9525">
                   <a:solidFill>
                     <a:srgbClr val="000000"/>
                   </a:solidFill>
@@ -4485,7 +4485,7 @@
             </a:ln>
             <a:extLst>
               <a:ext uri="{91240B29-F687-4f45-9708-019B960494DF}">
-                <a14:hiddenLine xmlns:a14="http://schemas.microsoft.com/office/drawing/2010/main" xmlns="" w="9525">
+                <a14:hiddenLine xmlns="" xmlns:a14="http://schemas.microsoft.com/office/drawing/2010/main" w="9525">
                   <a:solidFill>
                     <a:srgbClr val="000000"/>
                   </a:solidFill>
@@ -4541,7 +4541,7 @@
             </a:ln>
             <a:extLst>
               <a:ext uri="{91240B29-F687-4f45-9708-019B960494DF}">
-                <a14:hiddenLine xmlns:a14="http://schemas.microsoft.com/office/drawing/2010/main" xmlns="" w="9525">
+                <a14:hiddenLine xmlns="" xmlns:a14="http://schemas.microsoft.com/office/drawing/2010/main" w="9525">
                   <a:solidFill>
                     <a:srgbClr val="000000"/>
                   </a:solidFill>
@@ -4631,7 +4631,7 @@
             </a:ln>
             <a:extLst>
               <a:ext uri="{91240B29-F687-4f45-9708-019B960494DF}">
-                <a14:hiddenLine xmlns:a14="http://schemas.microsoft.com/office/drawing/2010/main" xmlns="" w="9525">
+                <a14:hiddenLine xmlns="" xmlns:a14="http://schemas.microsoft.com/office/drawing/2010/main" w="9525">
                   <a:solidFill>
                     <a:srgbClr val="000000"/>
                   </a:solidFill>
@@ -4699,7 +4699,7 @@
             </a:ln>
             <a:extLst>
               <a:ext uri="{91240B29-F687-4f45-9708-019B960494DF}">
-                <a14:hiddenLine xmlns:a14="http://schemas.microsoft.com/office/drawing/2010/main" xmlns="" w="9525">
+                <a14:hiddenLine xmlns="" xmlns:a14="http://schemas.microsoft.com/office/drawing/2010/main" w="9525">
                   <a:solidFill>
                     <a:srgbClr val="000000"/>
                   </a:solidFill>
@@ -4789,7 +4789,7 @@
             </a:ln>
             <a:extLst>
               <a:ext uri="{91240B29-F687-4f45-9708-019B960494DF}">
-                <a14:hiddenLine xmlns:a14="http://schemas.microsoft.com/office/drawing/2010/main" xmlns="" w="9525">
+                <a14:hiddenLine xmlns="" xmlns:a14="http://schemas.microsoft.com/office/drawing/2010/main" w="9525">
                   <a:solidFill>
                     <a:srgbClr val="000000"/>
                   </a:solidFill>
@@ -4857,7 +4857,7 @@
             </a:ln>
             <a:extLst>
               <a:ext uri="{91240B29-F687-4f45-9708-019B960494DF}">
-                <a14:hiddenLine xmlns:a14="http://schemas.microsoft.com/office/drawing/2010/main" xmlns="" w="9525">
+                <a14:hiddenLine xmlns="" xmlns:a14="http://schemas.microsoft.com/office/drawing/2010/main" w="9525">
                   <a:solidFill>
                     <a:srgbClr val="000000"/>
                   </a:solidFill>
@@ -4947,7 +4947,7 @@
             </a:ln>
             <a:extLst>
               <a:ext uri="{91240B29-F687-4f45-9708-019B960494DF}">
-                <a14:hiddenLine xmlns:a14="http://schemas.microsoft.com/office/drawing/2010/main" xmlns="" w="9525">
+                <a14:hiddenLine xmlns="" xmlns:a14="http://schemas.microsoft.com/office/drawing/2010/main" w="9525">
                   <a:solidFill>
                     <a:srgbClr val="000000"/>
                   </a:solidFill>
@@ -4981,7 +4981,7 @@
             </a:ln>
             <a:extLst>
               <a:ext uri="{91240B29-F687-4f45-9708-019B960494DF}">
-                <a14:hiddenLine xmlns:a14="http://schemas.microsoft.com/office/drawing/2010/main" xmlns="" w="9525">
+                <a14:hiddenLine xmlns="" xmlns:a14="http://schemas.microsoft.com/office/drawing/2010/main" w="9525">
                   <a:solidFill>
                     <a:srgbClr val="000000"/>
                   </a:solidFill>
@@ -5071,7 +5071,7 @@
             </a:ln>
             <a:extLst>
               <a:ext uri="{91240B29-F687-4f45-9708-019B960494DF}">
-                <a14:hiddenLine xmlns:a14="http://schemas.microsoft.com/office/drawing/2010/main" xmlns="" w="9525">
+                <a14:hiddenLine xmlns="" xmlns:a14="http://schemas.microsoft.com/office/drawing/2010/main" w="9525">
                   <a:solidFill>
                     <a:srgbClr val="000000"/>
                   </a:solidFill>
@@ -5133,7 +5133,7 @@
             </a:ln>
             <a:extLst>
               <a:ext uri="{91240B29-F687-4f45-9708-019B960494DF}">
-                <a14:hiddenLine xmlns:a14="http://schemas.microsoft.com/office/drawing/2010/main" xmlns="" w="9525">
+                <a14:hiddenLine xmlns="" xmlns:a14="http://schemas.microsoft.com/office/drawing/2010/main" w="9525">
                   <a:solidFill>
                     <a:srgbClr val="000000"/>
                   </a:solidFill>
@@ -5195,7 +5195,7 @@
             </a:ln>
             <a:extLst>
               <a:ext uri="{91240B29-F687-4f45-9708-019B960494DF}">
-                <a14:hiddenLine xmlns:a14="http://schemas.microsoft.com/office/drawing/2010/main" xmlns="" w="9525">
+                <a14:hiddenLine xmlns="" xmlns:a14="http://schemas.microsoft.com/office/drawing/2010/main" w="9525">
                   <a:solidFill>
                     <a:srgbClr val="000000"/>
                   </a:solidFill>
@@ -5285,7 +5285,7 @@
             </a:ln>
             <a:extLst>
               <a:ext uri="{91240B29-F687-4f45-9708-019B960494DF}">
-                <a14:hiddenLine xmlns:a14="http://schemas.microsoft.com/office/drawing/2010/main" xmlns="" w="9525">
+                <a14:hiddenLine xmlns="" xmlns:a14="http://schemas.microsoft.com/office/drawing/2010/main" w="9525">
                   <a:solidFill>
                     <a:srgbClr val="000000"/>
                   </a:solidFill>
@@ -5353,7 +5353,7 @@
             </a:ln>
             <a:extLst>
               <a:ext uri="{91240B29-F687-4f45-9708-019B960494DF}">
-                <a14:hiddenLine xmlns:a14="http://schemas.microsoft.com/office/drawing/2010/main" xmlns="" w="9525">
+                <a14:hiddenLine xmlns="" xmlns:a14="http://schemas.microsoft.com/office/drawing/2010/main" w="9525">
                   <a:solidFill>
                     <a:srgbClr val="000000"/>
                   </a:solidFill>
@@ -5415,7 +5415,7 @@
             </a:ln>
             <a:extLst>
               <a:ext uri="{91240B29-F687-4f45-9708-019B960494DF}">
-                <a14:hiddenLine xmlns:a14="http://schemas.microsoft.com/office/drawing/2010/main" xmlns="" w="9525">
+                <a14:hiddenLine xmlns="" xmlns:a14="http://schemas.microsoft.com/office/drawing/2010/main" w="9525">
                   <a:solidFill>
                     <a:srgbClr val="000000"/>
                   </a:solidFill>
@@ -5505,7 +5505,7 @@
             </a:ln>
             <a:extLst>
               <a:ext uri="{91240B29-F687-4f45-9708-019B960494DF}">
-                <a14:hiddenLine xmlns:a14="http://schemas.microsoft.com/office/drawing/2010/main" xmlns="" w="9525">
+                <a14:hiddenLine xmlns="" xmlns:a14="http://schemas.microsoft.com/office/drawing/2010/main" w="9525">
                   <a:solidFill>
                     <a:srgbClr val="000000"/>
                   </a:solidFill>
@@ -5567,7 +5567,7 @@
             </a:ln>
             <a:extLst>
               <a:ext uri="{91240B29-F687-4f45-9708-019B960494DF}">
-                <a14:hiddenLine xmlns:a14="http://schemas.microsoft.com/office/drawing/2010/main" xmlns="" w="9525">
+                <a14:hiddenLine xmlns="" xmlns:a14="http://schemas.microsoft.com/office/drawing/2010/main" w="9525">
                   <a:solidFill>
                     <a:srgbClr val="000000"/>
                   </a:solidFill>
@@ -5657,7 +5657,7 @@
             </a:ln>
             <a:extLst>
               <a:ext uri="{91240B29-F687-4f45-9708-019B960494DF}">
-                <a14:hiddenLine xmlns:a14="http://schemas.microsoft.com/office/drawing/2010/main" xmlns="" w="9525">
+                <a14:hiddenLine xmlns="" xmlns:a14="http://schemas.microsoft.com/office/drawing/2010/main" w="9525">
                   <a:solidFill>
                     <a:srgbClr val="000000"/>
                   </a:solidFill>
@@ -5719,7 +5719,7 @@
             </a:ln>
             <a:extLst>
               <a:ext uri="{91240B29-F687-4f45-9708-019B960494DF}">
-                <a14:hiddenLine xmlns:a14="http://schemas.microsoft.com/office/drawing/2010/main" xmlns="" w="9525">
+                <a14:hiddenLine xmlns="" xmlns:a14="http://schemas.microsoft.com/office/drawing/2010/main" w="9525">
                   <a:solidFill>
                     <a:srgbClr val="000000"/>
                   </a:solidFill>
@@ -5809,7 +5809,7 @@
             </a:ln>
             <a:extLst>
               <a:ext uri="{91240B29-F687-4f45-9708-019B960494DF}">
-                <a14:hiddenLine xmlns:a14="http://schemas.microsoft.com/office/drawing/2010/main" xmlns="" w="9525">
+                <a14:hiddenLine xmlns="" xmlns:a14="http://schemas.microsoft.com/office/drawing/2010/main" w="9525">
                   <a:solidFill>
                     <a:srgbClr val="000000"/>
                   </a:solidFill>
@@ -5843,7 +5843,7 @@
             </a:ln>
             <a:extLst>
               <a:ext uri="{91240B29-F687-4f45-9708-019B960494DF}">
-                <a14:hiddenLine xmlns:a14="http://schemas.microsoft.com/office/drawing/2010/main" xmlns="" w="9525">
+                <a14:hiddenLine xmlns="" xmlns:a14="http://schemas.microsoft.com/office/drawing/2010/main" w="9525">
                   <a:solidFill>
                     <a:srgbClr val="000000"/>
                   </a:solidFill>
@@ -5908,7 +5908,7 @@
             </a:ln>
             <a:extLst>
               <a:ext uri="{91240B29-F687-4f45-9708-019B960494DF}">
-                <a14:hiddenLine xmlns:a14="http://schemas.microsoft.com/office/drawing/2010/main" xmlns="" w="9525">
+                <a14:hiddenLine xmlns="" xmlns:a14="http://schemas.microsoft.com/office/drawing/2010/main" w="9525">
                   <a:solidFill>
                     <a:srgbClr val="000000"/>
                   </a:solidFill>
@@ -5998,7 +5998,7 @@
             </a:ln>
             <a:extLst>
               <a:ext uri="{91240B29-F687-4f45-9708-019B960494DF}">
-                <a14:hiddenLine xmlns:a14="http://schemas.microsoft.com/office/drawing/2010/main" xmlns="" w="9525">
+                <a14:hiddenLine xmlns="" xmlns:a14="http://schemas.microsoft.com/office/drawing/2010/main" w="9525">
                   <a:solidFill>
                     <a:srgbClr val="000000"/>
                   </a:solidFill>
@@ -6060,7 +6060,7 @@
             </a:ln>
             <a:extLst>
               <a:ext uri="{91240B29-F687-4f45-9708-019B960494DF}">
-                <a14:hiddenLine xmlns:a14="http://schemas.microsoft.com/office/drawing/2010/main" xmlns="" w="9525">
+                <a14:hiddenLine xmlns="" xmlns:a14="http://schemas.microsoft.com/office/drawing/2010/main" w="9525">
                   <a:solidFill>
                     <a:srgbClr val="000000"/>
                   </a:solidFill>
@@ -6150,7 +6150,7 @@
             </a:ln>
             <a:extLst>
               <a:ext uri="{91240B29-F687-4f45-9708-019B960494DF}">
-                <a14:hiddenLine xmlns:a14="http://schemas.microsoft.com/office/drawing/2010/main" xmlns="" w="9525">
+                <a14:hiddenLine xmlns="" xmlns:a14="http://schemas.microsoft.com/office/drawing/2010/main" w="9525">
                   <a:solidFill>
                     <a:srgbClr val="000000"/>
                   </a:solidFill>
@@ -6240,7 +6240,7 @@
             </a:ln>
             <a:extLst>
               <a:ext uri="{91240B29-F687-4f45-9708-019B960494DF}">
-                <a14:hiddenLine xmlns:a14="http://schemas.microsoft.com/office/drawing/2010/main" xmlns="" w="9525">
+                <a14:hiddenLine xmlns="" xmlns:a14="http://schemas.microsoft.com/office/drawing/2010/main" w="9525">
                   <a:solidFill>
                     <a:srgbClr val="000000"/>
                   </a:solidFill>
@@ -6305,7 +6305,7 @@
             </a:ln>
             <a:extLst>
               <a:ext uri="{91240B29-F687-4f45-9708-019B960494DF}">
-                <a14:hiddenLine xmlns:a14="http://schemas.microsoft.com/office/drawing/2010/main" xmlns="" w="9525">
+                <a14:hiddenLine xmlns="" xmlns:a14="http://schemas.microsoft.com/office/drawing/2010/main" w="9525">
                   <a:solidFill>
                     <a:srgbClr val="000000"/>
                   </a:solidFill>
@@ -6367,7 +6367,7 @@
             </a:ln>
             <a:extLst>
               <a:ext uri="{91240B29-F687-4f45-9708-019B960494DF}">
-                <a14:hiddenLine xmlns:a14="http://schemas.microsoft.com/office/drawing/2010/main" xmlns="" w="9525">
+                <a14:hiddenLine xmlns="" xmlns:a14="http://schemas.microsoft.com/office/drawing/2010/main" w="9525">
                   <a:solidFill>
                     <a:srgbClr val="000000"/>
                   </a:solidFill>
@@ -6457,7 +6457,7 @@
             </a:ln>
             <a:extLst>
               <a:ext uri="{91240B29-F687-4f45-9708-019B960494DF}">
-                <a14:hiddenLine xmlns:a14="http://schemas.microsoft.com/office/drawing/2010/main" xmlns="" w="9525">
+                <a14:hiddenLine xmlns="" xmlns:a14="http://schemas.microsoft.com/office/drawing/2010/main" w="9525">
                   <a:solidFill>
                     <a:srgbClr val="000000"/>
                   </a:solidFill>
@@ -6547,7 +6547,7 @@
             </a:ln>
             <a:extLst>
               <a:ext uri="{91240B29-F687-4f45-9708-019B960494DF}">
-                <a14:hiddenLine xmlns:a14="http://schemas.microsoft.com/office/drawing/2010/main" xmlns="" w="9525">
+                <a14:hiddenLine xmlns="" xmlns:a14="http://schemas.microsoft.com/office/drawing/2010/main" w="9525">
                   <a:solidFill>
                     <a:srgbClr val="000000"/>
                   </a:solidFill>
@@ -6609,7 +6609,7 @@
             </a:ln>
             <a:extLst>
               <a:ext uri="{91240B29-F687-4f45-9708-019B960494DF}">
-                <a14:hiddenLine xmlns:a14="http://schemas.microsoft.com/office/drawing/2010/main" xmlns="" w="9525">
+                <a14:hiddenLine xmlns="" xmlns:a14="http://schemas.microsoft.com/office/drawing/2010/main" w="9525">
                   <a:solidFill>
                     <a:srgbClr val="000000"/>
                   </a:solidFill>
@@ -6729,7 +6729,7 @@
             </a:ln>
             <a:extLst>
               <a:ext uri="{91240B29-F687-4f45-9708-019B960494DF}">
-                <a14:hiddenLine xmlns:a14="http://schemas.microsoft.com/office/drawing/2010/main" xmlns="" w="9525">
+                <a14:hiddenLine xmlns="" xmlns:a14="http://schemas.microsoft.com/office/drawing/2010/main" w="9525">
                   <a:solidFill>
                     <a:srgbClr val="000000"/>
                   </a:solidFill>
@@ -6797,7 +6797,7 @@
             </a:ln>
             <a:extLst>
               <a:ext uri="{91240B29-F687-4f45-9708-019B960494DF}">
-                <a14:hiddenLine xmlns:a14="http://schemas.microsoft.com/office/drawing/2010/main" xmlns="" w="9525">
+                <a14:hiddenLine xmlns="" xmlns:a14="http://schemas.microsoft.com/office/drawing/2010/main" w="9525">
                   <a:solidFill>
                     <a:srgbClr val="000000"/>
                   </a:solidFill>
@@ -6887,7 +6887,7 @@
             </a:ln>
             <a:extLst>
               <a:ext uri="{91240B29-F687-4f45-9708-019B960494DF}">
-                <a14:hiddenLine xmlns:a14="http://schemas.microsoft.com/office/drawing/2010/main" xmlns="" w="9525">
+                <a14:hiddenLine xmlns="" xmlns:a14="http://schemas.microsoft.com/office/drawing/2010/main" w="9525">
                   <a:solidFill>
                     <a:srgbClr val="000000"/>
                   </a:solidFill>
@@ -11694,7 +11694,7 @@
           <a:noFill/>
           <a:extLst>
             <a:ext uri="{909E8E84-426E-40dd-AFC4-6F175D3DCCD1}">
-              <a14:hiddenFill xmlns:a14="http://schemas.microsoft.com/office/drawing/2010/main" xmlns="">
+              <a14:hiddenFill xmlns="" xmlns:a14="http://schemas.microsoft.com/office/drawing/2010/main">
                 <a:solidFill>
                   <a:srgbClr val="FFFFFF"/>
                 </a:solidFill>
@@ -11768,7 +11768,7 @@
               </a:ln>
               <a:extLst>
                 <a:ext uri="{91240B29-F687-4f45-9708-019B960494DF}">
-                  <a14:hiddenLine xmlns:a14="http://schemas.microsoft.com/office/drawing/2010/main" xmlns="" w="9525">
+                  <a14:hiddenLine xmlns="" xmlns:a14="http://schemas.microsoft.com/office/drawing/2010/main" w="9525">
                     <a:solidFill>
                       <a:srgbClr val="000000"/>
                     </a:solidFill>
@@ -11858,7 +11858,7 @@
               </a:ln>
               <a:extLst>
                 <a:ext uri="{91240B29-F687-4f45-9708-019B960494DF}">
-                  <a14:hiddenLine xmlns:a14="http://schemas.microsoft.com/office/drawing/2010/main" xmlns="" w="9525">
+                  <a14:hiddenLine xmlns="" xmlns:a14="http://schemas.microsoft.com/office/drawing/2010/main" w="9525">
                     <a:solidFill>
                       <a:srgbClr val="000000"/>
                     </a:solidFill>
@@ -11948,7 +11948,7 @@
               </a:ln>
               <a:extLst>
                 <a:ext uri="{91240B29-F687-4f45-9708-019B960494DF}">
-                  <a14:hiddenLine xmlns:a14="http://schemas.microsoft.com/office/drawing/2010/main" xmlns="" w="9525">
+                  <a14:hiddenLine xmlns="" xmlns:a14="http://schemas.microsoft.com/office/drawing/2010/main" w="9525">
                     <a:solidFill>
                       <a:srgbClr val="000000"/>
                     </a:solidFill>
@@ -12010,7 +12010,7 @@
               </a:ln>
               <a:extLst>
                 <a:ext uri="{91240B29-F687-4f45-9708-019B960494DF}">
-                  <a14:hiddenLine xmlns:a14="http://schemas.microsoft.com/office/drawing/2010/main" xmlns="" w="9525">
+                  <a14:hiddenLine xmlns="" xmlns:a14="http://schemas.microsoft.com/office/drawing/2010/main" w="9525">
                     <a:solidFill>
                       <a:srgbClr val="000000"/>
                     </a:solidFill>
@@ -12100,7 +12100,7 @@
               </a:ln>
               <a:extLst>
                 <a:ext uri="{91240B29-F687-4f45-9708-019B960494DF}">
-                  <a14:hiddenLine xmlns:a14="http://schemas.microsoft.com/office/drawing/2010/main" xmlns="" w="9525">
+                  <a14:hiddenLine xmlns="" xmlns:a14="http://schemas.microsoft.com/office/drawing/2010/main" w="9525">
                     <a:solidFill>
                       <a:srgbClr val="000000"/>
                     </a:solidFill>
@@ -12162,7 +12162,7 @@
               </a:ln>
               <a:extLst>
                 <a:ext uri="{91240B29-F687-4f45-9708-019B960494DF}">
-                  <a14:hiddenLine xmlns:a14="http://schemas.microsoft.com/office/drawing/2010/main" xmlns="" w="9525">
+                  <a14:hiddenLine xmlns="" xmlns:a14="http://schemas.microsoft.com/office/drawing/2010/main" w="9525">
                     <a:solidFill>
                       <a:srgbClr val="000000"/>
                     </a:solidFill>
@@ -12224,7 +12224,7 @@
               </a:ln>
               <a:extLst>
                 <a:ext uri="{91240B29-F687-4f45-9708-019B960494DF}">
-                  <a14:hiddenLine xmlns:a14="http://schemas.microsoft.com/office/drawing/2010/main" xmlns="" w="9525">
+                  <a14:hiddenLine xmlns="" xmlns:a14="http://schemas.microsoft.com/office/drawing/2010/main" w="9525">
                     <a:solidFill>
                       <a:srgbClr val="000000"/>
                     </a:solidFill>
@@ -12314,7 +12314,7 @@
               </a:ln>
               <a:extLst>
                 <a:ext uri="{91240B29-F687-4f45-9708-019B960494DF}">
-                  <a14:hiddenLine xmlns:a14="http://schemas.microsoft.com/office/drawing/2010/main" xmlns="" w="9525">
+                  <a14:hiddenLine xmlns="" xmlns:a14="http://schemas.microsoft.com/office/drawing/2010/main" w="9525">
                     <a:solidFill>
                       <a:srgbClr val="000000"/>
                     </a:solidFill>
@@ -12404,7 +12404,7 @@
               </a:ln>
               <a:extLst>
                 <a:ext uri="{91240B29-F687-4f45-9708-019B960494DF}">
-                  <a14:hiddenLine xmlns:a14="http://schemas.microsoft.com/office/drawing/2010/main" xmlns="" w="9525">
+                  <a14:hiddenLine xmlns="" xmlns:a14="http://schemas.microsoft.com/office/drawing/2010/main" w="9525">
                     <a:solidFill>
                       <a:srgbClr val="000000"/>
                     </a:solidFill>
@@ -12466,7 +12466,7 @@
               </a:ln>
               <a:extLst>
                 <a:ext uri="{91240B29-F687-4f45-9708-019B960494DF}">
-                  <a14:hiddenLine xmlns:a14="http://schemas.microsoft.com/office/drawing/2010/main" xmlns="" w="9525">
+                  <a14:hiddenLine xmlns="" xmlns:a14="http://schemas.microsoft.com/office/drawing/2010/main" w="9525">
                     <a:solidFill>
                       <a:srgbClr val="000000"/>
                     </a:solidFill>
@@ -12576,7 +12576,7 @@
               </a:ln>
               <a:extLst>
                 <a:ext uri="{91240B29-F687-4f45-9708-019B960494DF}">
-                  <a14:hiddenLine xmlns:a14="http://schemas.microsoft.com/office/drawing/2010/main" xmlns="" w="9525">
+                  <a14:hiddenLine xmlns="" xmlns:a14="http://schemas.microsoft.com/office/drawing/2010/main" w="9525">
                     <a:solidFill>
                       <a:srgbClr val="000000"/>
                     </a:solidFill>
@@ -12660,7 +12660,7 @@
               </a:ln>
               <a:extLst>
                 <a:ext uri="{91240B29-F687-4f45-9708-019B960494DF}">
-                  <a14:hiddenLine xmlns:a14="http://schemas.microsoft.com/office/drawing/2010/main" xmlns="" w="9525">
+                  <a14:hiddenLine xmlns="" xmlns:a14="http://schemas.microsoft.com/office/drawing/2010/main" w="9525">
                     <a:solidFill>
                       <a:srgbClr val="000000"/>
                     </a:solidFill>
@@ -12722,7 +12722,7 @@
               </a:ln>
               <a:extLst>
                 <a:ext uri="{91240B29-F687-4f45-9708-019B960494DF}">
-                  <a14:hiddenLine xmlns:a14="http://schemas.microsoft.com/office/drawing/2010/main" xmlns="" w="9525">
+                  <a14:hiddenLine xmlns="" xmlns:a14="http://schemas.microsoft.com/office/drawing/2010/main" w="9525">
                     <a:solidFill>
                       <a:srgbClr val="000000"/>
                     </a:solidFill>
@@ -12784,7 +12784,7 @@
               </a:ln>
               <a:extLst>
                 <a:ext uri="{91240B29-F687-4f45-9708-019B960494DF}">
-                  <a14:hiddenLine xmlns:a14="http://schemas.microsoft.com/office/drawing/2010/main" xmlns="" w="9525">
+                  <a14:hiddenLine xmlns="" xmlns:a14="http://schemas.microsoft.com/office/drawing/2010/main" w="9525">
                     <a:solidFill>
                       <a:srgbClr val="000000"/>
                     </a:solidFill>
@@ -12874,7 +12874,7 @@
               </a:ln>
               <a:extLst>
                 <a:ext uri="{91240B29-F687-4f45-9708-019B960494DF}">
-                  <a14:hiddenLine xmlns:a14="http://schemas.microsoft.com/office/drawing/2010/main" xmlns="" w="9525">
+                  <a14:hiddenLine xmlns="" xmlns:a14="http://schemas.microsoft.com/office/drawing/2010/main" w="9525">
                     <a:solidFill>
                       <a:srgbClr val="000000"/>
                     </a:solidFill>
@@ -12908,7 +12908,7 @@
               </a:ln>
               <a:extLst>
                 <a:ext uri="{91240B29-F687-4f45-9708-019B960494DF}">
-                  <a14:hiddenLine xmlns:a14="http://schemas.microsoft.com/office/drawing/2010/main" xmlns="" w="9525">
+                  <a14:hiddenLine xmlns="" xmlns:a14="http://schemas.microsoft.com/office/drawing/2010/main" w="9525">
                     <a:solidFill>
                       <a:srgbClr val="000000"/>
                     </a:solidFill>
@@ -12973,7 +12973,7 @@
               </a:ln>
               <a:extLst>
                 <a:ext uri="{91240B29-F687-4f45-9708-019B960494DF}">
-                  <a14:hiddenLine xmlns:a14="http://schemas.microsoft.com/office/drawing/2010/main" xmlns="" w="9525">
+                  <a14:hiddenLine xmlns="" xmlns:a14="http://schemas.microsoft.com/office/drawing/2010/main" w="9525">
                     <a:solidFill>
                       <a:srgbClr val="000000"/>
                     </a:solidFill>
@@ -13063,7 +13063,7 @@
               </a:ln>
               <a:extLst>
                 <a:ext uri="{91240B29-F687-4f45-9708-019B960494DF}">
-                  <a14:hiddenLine xmlns:a14="http://schemas.microsoft.com/office/drawing/2010/main" xmlns="" w="9525">
+                  <a14:hiddenLine xmlns="" xmlns:a14="http://schemas.microsoft.com/office/drawing/2010/main" w="9525">
                     <a:solidFill>
                       <a:srgbClr val="000000"/>
                     </a:solidFill>
@@ -13125,7 +13125,7 @@
               </a:ln>
               <a:extLst>
                 <a:ext uri="{91240B29-F687-4f45-9708-019B960494DF}">
-                  <a14:hiddenLine xmlns:a14="http://schemas.microsoft.com/office/drawing/2010/main" xmlns="" w="9525">
+                  <a14:hiddenLine xmlns="" xmlns:a14="http://schemas.microsoft.com/office/drawing/2010/main" w="9525">
                     <a:solidFill>
                       <a:srgbClr val="000000"/>
                     </a:solidFill>
@@ -13215,7 +13215,7 @@
               </a:ln>
               <a:extLst>
                 <a:ext uri="{91240B29-F687-4f45-9708-019B960494DF}">
-                  <a14:hiddenLine xmlns:a14="http://schemas.microsoft.com/office/drawing/2010/main" xmlns="" w="9525">
+                  <a14:hiddenLine xmlns="" xmlns:a14="http://schemas.microsoft.com/office/drawing/2010/main" w="9525">
                     <a:solidFill>
                       <a:srgbClr val="000000"/>
                     </a:solidFill>
@@ -13280,7 +13280,7 @@
               </a:ln>
               <a:extLst>
                 <a:ext uri="{91240B29-F687-4f45-9708-019B960494DF}">
-                  <a14:hiddenLine xmlns:a14="http://schemas.microsoft.com/office/drawing/2010/main" xmlns="" w="9525">
+                  <a14:hiddenLine xmlns="" xmlns:a14="http://schemas.microsoft.com/office/drawing/2010/main" w="9525">
                     <a:solidFill>
                       <a:srgbClr val="000000"/>
                     </a:solidFill>
@@ -13342,7 +13342,7 @@
               </a:ln>
               <a:extLst>
                 <a:ext uri="{91240B29-F687-4f45-9708-019B960494DF}">
-                  <a14:hiddenLine xmlns:a14="http://schemas.microsoft.com/office/drawing/2010/main" xmlns="" w="9525">
+                  <a14:hiddenLine xmlns="" xmlns:a14="http://schemas.microsoft.com/office/drawing/2010/main" w="9525">
                     <a:solidFill>
                       <a:srgbClr val="000000"/>
                     </a:solidFill>
@@ -13432,7 +13432,7 @@
               </a:ln>
               <a:extLst>
                 <a:ext uri="{91240B29-F687-4f45-9708-019B960494DF}">
-                  <a14:hiddenLine xmlns:a14="http://schemas.microsoft.com/office/drawing/2010/main" xmlns="" w="9525">
+                  <a14:hiddenLine xmlns="" xmlns:a14="http://schemas.microsoft.com/office/drawing/2010/main" w="9525">
                     <a:solidFill>
                       <a:srgbClr val="000000"/>
                     </a:solidFill>
@@ -13522,7 +13522,7 @@
               </a:ln>
               <a:extLst>
                 <a:ext uri="{91240B29-F687-4f45-9708-019B960494DF}">
-                  <a14:hiddenLine xmlns:a14="http://schemas.microsoft.com/office/drawing/2010/main" xmlns="" w="9525">
+                  <a14:hiddenLine xmlns="" xmlns:a14="http://schemas.microsoft.com/office/drawing/2010/main" w="9525">
                     <a:solidFill>
                       <a:srgbClr val="000000"/>
                     </a:solidFill>
@@ -13587,7 +13587,7 @@
               </a:ln>
               <a:extLst>
                 <a:ext uri="{91240B29-F687-4f45-9708-019B960494DF}">
-                  <a14:hiddenLine xmlns:a14="http://schemas.microsoft.com/office/drawing/2010/main" xmlns="" w="9525">
+                  <a14:hiddenLine xmlns="" xmlns:a14="http://schemas.microsoft.com/office/drawing/2010/main" w="9525">
                     <a:solidFill>
                       <a:srgbClr val="000000"/>
                     </a:solidFill>
@@ -13707,7 +13707,7 @@
               </a:ln>
               <a:extLst>
                 <a:ext uri="{91240B29-F687-4f45-9708-019B960494DF}">
-                  <a14:hiddenLine xmlns:a14="http://schemas.microsoft.com/office/drawing/2010/main" xmlns="" w="9525">
+                  <a14:hiddenLine xmlns="" xmlns:a14="http://schemas.microsoft.com/office/drawing/2010/main" w="9525">
                     <a:solidFill>
                       <a:srgbClr val="000000"/>
                     </a:solidFill>
@@ -13805,7 +13805,7 @@
               </a:ln>
               <a:extLst>
                 <a:ext uri="{91240B29-F687-4f45-9708-019B960494DF}">
-                  <a14:hiddenLine xmlns:a14="http://schemas.microsoft.com/office/drawing/2010/main" xmlns="" w="9525">
+                  <a14:hiddenLine xmlns="" xmlns:a14="http://schemas.microsoft.com/office/drawing/2010/main" w="9525">
                     <a:solidFill>
                       <a:srgbClr val="000000"/>
                     </a:solidFill>
@@ -13920,7 +13920,7 @@
               </a:ln>
               <a:extLst>
                 <a:ext uri="{91240B29-F687-4f45-9708-019B960494DF}">
-                  <a14:hiddenLine xmlns:a14="http://schemas.microsoft.com/office/drawing/2010/main" xmlns="" w="9525">
+                  <a14:hiddenLine xmlns="" xmlns:a14="http://schemas.microsoft.com/office/drawing/2010/main" w="9525">
                     <a:solidFill>
                       <a:srgbClr val="000000"/>
                     </a:solidFill>
@@ -14010,7 +14010,7 @@
               </a:ln>
               <a:extLst>
                 <a:ext uri="{91240B29-F687-4f45-9708-019B960494DF}">
-                  <a14:hiddenLine xmlns:a14="http://schemas.microsoft.com/office/drawing/2010/main" xmlns="" w="9525">
+                  <a14:hiddenLine xmlns="" xmlns:a14="http://schemas.microsoft.com/office/drawing/2010/main" w="9525">
                     <a:solidFill>
                       <a:srgbClr val="000000"/>
                     </a:solidFill>
@@ -14075,7 +14075,7 @@
               </a:ln>
               <a:extLst>
                 <a:ext uri="{91240B29-F687-4f45-9708-019B960494DF}">
-                  <a14:hiddenLine xmlns:a14="http://schemas.microsoft.com/office/drawing/2010/main" xmlns="" w="9525">
+                  <a14:hiddenLine xmlns="" xmlns:a14="http://schemas.microsoft.com/office/drawing/2010/main" w="9525">
                     <a:solidFill>
                       <a:srgbClr val="000000"/>
                     </a:solidFill>
@@ -14165,7 +14165,7 @@
               </a:ln>
               <a:extLst>
                 <a:ext uri="{91240B29-F687-4f45-9708-019B960494DF}">
-                  <a14:hiddenLine xmlns:a14="http://schemas.microsoft.com/office/drawing/2010/main" xmlns="" w="9525">
+                  <a14:hiddenLine xmlns="" xmlns:a14="http://schemas.microsoft.com/office/drawing/2010/main" w="9525">
                     <a:solidFill>
                       <a:srgbClr val="000000"/>
                     </a:solidFill>
@@ -14233,7 +14233,7 @@
               </a:ln>
               <a:extLst>
                 <a:ext uri="{91240B29-F687-4f45-9708-019B960494DF}">
-                  <a14:hiddenLine xmlns:a14="http://schemas.microsoft.com/office/drawing/2010/main" xmlns="" w="9525">
+                  <a14:hiddenLine xmlns="" xmlns:a14="http://schemas.microsoft.com/office/drawing/2010/main" w="9525">
                     <a:solidFill>
                       <a:srgbClr val="000000"/>
                     </a:solidFill>
@@ -14323,7 +14323,7 @@
               </a:ln>
               <a:extLst>
                 <a:ext uri="{91240B29-F687-4f45-9708-019B960494DF}">
-                  <a14:hiddenLine xmlns:a14="http://schemas.microsoft.com/office/drawing/2010/main" xmlns="" w="9525">
+                  <a14:hiddenLine xmlns="" xmlns:a14="http://schemas.microsoft.com/office/drawing/2010/main" w="9525">
                     <a:solidFill>
                       <a:srgbClr val="000000"/>
                     </a:solidFill>
@@ -14391,7 +14391,7 @@
               </a:ln>
               <a:extLst>
                 <a:ext uri="{91240B29-F687-4f45-9708-019B960494DF}">
-                  <a14:hiddenLine xmlns:a14="http://schemas.microsoft.com/office/drawing/2010/main" xmlns="" w="9525">
+                  <a14:hiddenLine xmlns="" xmlns:a14="http://schemas.microsoft.com/office/drawing/2010/main" w="9525">
                     <a:solidFill>
                       <a:srgbClr val="000000"/>
                     </a:solidFill>
@@ -14481,7 +14481,7 @@
               </a:ln>
               <a:extLst>
                 <a:ext uri="{91240B29-F687-4f45-9708-019B960494DF}">
-                  <a14:hiddenLine xmlns:a14="http://schemas.microsoft.com/office/drawing/2010/main" xmlns="" w="9525">
+                  <a14:hiddenLine xmlns="" xmlns:a14="http://schemas.microsoft.com/office/drawing/2010/main" w="9525">
                     <a:solidFill>
                       <a:srgbClr val="000000"/>
                     </a:solidFill>
@@ -14515,7 +14515,7 @@
               </a:ln>
               <a:extLst>
                 <a:ext uri="{91240B29-F687-4f45-9708-019B960494DF}">
-                  <a14:hiddenLine xmlns:a14="http://schemas.microsoft.com/office/drawing/2010/main" xmlns="" w="9525">
+                  <a14:hiddenLine xmlns="" xmlns:a14="http://schemas.microsoft.com/office/drawing/2010/main" w="9525">
                     <a:solidFill>
                       <a:srgbClr val="000000"/>
                     </a:solidFill>
@@ -18485,7 +18485,7 @@
 <file path=ppt/theme/theme1.xml><?xml version="1.0" encoding="utf-8"?>
 <a:theme xmlns:a="http://schemas.openxmlformats.org/drawingml/2006/main" name="MUDSS">
   <a:themeElements>
-    <a:clrScheme name="自定义 3">
+    <a:clrScheme name="自定义 4">
       <a:dk1>
         <a:srgbClr val="000000"/>
       </a:dk1>
@@ -18517,7 +18517,7 @@
         <a:srgbClr val="8AC4A7"/>
       </a:accent6>
       <a:hlink>
-        <a:srgbClr val="FAA93A"/>
+        <a:srgbClr val="A400DA"/>
       </a:hlink>
       <a:folHlink>
         <a:srgbClr val="7AF8CC"/>

</xml_diff>

<commit_message>
Updated workshop 4 to workshop 3
</commit_message>
<xml_diff>
--- a/Workshop 4: Polynomial Regression/Presentation.pptx
+++ b/Workshop 4: Polynomial Regression/Presentation.pptx
@@ -2801,7 +2801,7 @@
           <a:noFill/>
           <a:extLst>
             <a:ext uri="{909E8E84-426E-40dd-AFC4-6F175D3DCCD1}">
-              <a14:hiddenFill xmlns="" xmlns:a14="http://schemas.microsoft.com/office/drawing/2010/main">
+              <a14:hiddenFill xmlns:a14="http://schemas.microsoft.com/office/drawing/2010/main" xmlns="">
                 <a:solidFill>
                   <a:srgbClr val="FFFFFF"/>
                 </a:solidFill>
@@ -2861,7 +2861,7 @@
             </a:ln>
             <a:extLst>
               <a:ext uri="{91240B29-F687-4f45-9708-019B960494DF}">
-                <a14:hiddenLine xmlns="" xmlns:a14="http://schemas.microsoft.com/office/drawing/2010/main" w="9525">
+                <a14:hiddenLine xmlns:a14="http://schemas.microsoft.com/office/drawing/2010/main" xmlns="" w="9525">
                   <a:solidFill>
                     <a:srgbClr val="000000"/>
                   </a:solidFill>
@@ -2951,7 +2951,7 @@
             </a:ln>
             <a:extLst>
               <a:ext uri="{91240B29-F687-4f45-9708-019B960494DF}">
-                <a14:hiddenLine xmlns="" xmlns:a14="http://schemas.microsoft.com/office/drawing/2010/main" w="9525">
+                <a14:hiddenLine xmlns:a14="http://schemas.microsoft.com/office/drawing/2010/main" xmlns="" w="9525">
                   <a:solidFill>
                     <a:srgbClr val="000000"/>
                   </a:solidFill>
@@ -3041,7 +3041,7 @@
             </a:ln>
             <a:extLst>
               <a:ext uri="{91240B29-F687-4f45-9708-019B960494DF}">
-                <a14:hiddenLine xmlns="" xmlns:a14="http://schemas.microsoft.com/office/drawing/2010/main" w="9525">
+                <a14:hiddenLine xmlns:a14="http://schemas.microsoft.com/office/drawing/2010/main" xmlns="" w="9525">
                   <a:solidFill>
                     <a:srgbClr val="000000"/>
                   </a:solidFill>
@@ -3075,7 +3075,7 @@
             </a:ln>
             <a:extLst>
               <a:ext uri="{91240B29-F687-4f45-9708-019B960494DF}">
-                <a14:hiddenLine xmlns="" xmlns:a14="http://schemas.microsoft.com/office/drawing/2010/main" w="9525">
+                <a14:hiddenLine xmlns:a14="http://schemas.microsoft.com/office/drawing/2010/main" xmlns="" w="9525">
                   <a:solidFill>
                     <a:srgbClr val="000000"/>
                   </a:solidFill>
@@ -3165,7 +3165,7 @@
             </a:ln>
             <a:extLst>
               <a:ext uri="{91240B29-F687-4f45-9708-019B960494DF}">
-                <a14:hiddenLine xmlns="" xmlns:a14="http://schemas.microsoft.com/office/drawing/2010/main" w="9525">
+                <a14:hiddenLine xmlns:a14="http://schemas.microsoft.com/office/drawing/2010/main" xmlns="" w="9525">
                   <a:solidFill>
                     <a:srgbClr val="000000"/>
                   </a:solidFill>
@@ -3227,7 +3227,7 @@
             </a:ln>
             <a:extLst>
               <a:ext uri="{91240B29-F687-4f45-9708-019B960494DF}">
-                <a14:hiddenLine xmlns="" xmlns:a14="http://schemas.microsoft.com/office/drawing/2010/main" w="9525">
+                <a14:hiddenLine xmlns:a14="http://schemas.microsoft.com/office/drawing/2010/main" xmlns="" w="9525">
                   <a:solidFill>
                     <a:srgbClr val="000000"/>
                   </a:solidFill>
@@ -3289,7 +3289,7 @@
             </a:ln>
             <a:extLst>
               <a:ext uri="{91240B29-F687-4f45-9708-019B960494DF}">
-                <a14:hiddenLine xmlns="" xmlns:a14="http://schemas.microsoft.com/office/drawing/2010/main" w="9525">
+                <a14:hiddenLine xmlns:a14="http://schemas.microsoft.com/office/drawing/2010/main" xmlns="" w="9525">
                   <a:solidFill>
                     <a:srgbClr val="000000"/>
                   </a:solidFill>
@@ -3379,7 +3379,7 @@
             </a:ln>
             <a:extLst>
               <a:ext uri="{91240B29-F687-4f45-9708-019B960494DF}">
-                <a14:hiddenLine xmlns="" xmlns:a14="http://schemas.microsoft.com/office/drawing/2010/main" w="9525">
+                <a14:hiddenLine xmlns:a14="http://schemas.microsoft.com/office/drawing/2010/main" xmlns="" w="9525">
                   <a:solidFill>
                     <a:srgbClr val="000000"/>
                   </a:solidFill>
@@ -3441,7 +3441,7 @@
             </a:ln>
             <a:extLst>
               <a:ext uri="{91240B29-F687-4f45-9708-019B960494DF}">
-                <a14:hiddenLine xmlns="" xmlns:a14="http://schemas.microsoft.com/office/drawing/2010/main" w="9525">
+                <a14:hiddenLine xmlns:a14="http://schemas.microsoft.com/office/drawing/2010/main" xmlns="" w="9525">
                   <a:solidFill>
                     <a:srgbClr val="000000"/>
                   </a:solidFill>
@@ -3503,7 +3503,7 @@
             </a:ln>
             <a:extLst>
               <a:ext uri="{91240B29-F687-4f45-9708-019B960494DF}">
-                <a14:hiddenLine xmlns="" xmlns:a14="http://schemas.microsoft.com/office/drawing/2010/main" w="9525">
+                <a14:hiddenLine xmlns:a14="http://schemas.microsoft.com/office/drawing/2010/main" xmlns="" w="9525">
                   <a:solidFill>
                     <a:srgbClr val="000000"/>
                   </a:solidFill>
@@ -3593,7 +3593,7 @@
             </a:ln>
             <a:extLst>
               <a:ext uri="{91240B29-F687-4f45-9708-019B960494DF}">
-                <a14:hiddenLine xmlns="" xmlns:a14="http://schemas.microsoft.com/office/drawing/2010/main" w="9525">
+                <a14:hiddenLine xmlns:a14="http://schemas.microsoft.com/office/drawing/2010/main" xmlns="" w="9525">
                   <a:solidFill>
                     <a:srgbClr val="000000"/>
                   </a:solidFill>
@@ -3683,7 +3683,7 @@
             </a:ln>
             <a:extLst>
               <a:ext uri="{91240B29-F687-4f45-9708-019B960494DF}">
-                <a14:hiddenLine xmlns="" xmlns:a14="http://schemas.microsoft.com/office/drawing/2010/main" w="9525">
+                <a14:hiddenLine xmlns:a14="http://schemas.microsoft.com/office/drawing/2010/main" xmlns="" w="9525">
                   <a:solidFill>
                     <a:srgbClr val="000000"/>
                   </a:solidFill>
@@ -3745,7 +3745,7 @@
             </a:ln>
             <a:extLst>
               <a:ext uri="{91240B29-F687-4f45-9708-019B960494DF}">
-                <a14:hiddenLine xmlns="" xmlns:a14="http://schemas.microsoft.com/office/drawing/2010/main" w="9525">
+                <a14:hiddenLine xmlns:a14="http://schemas.microsoft.com/office/drawing/2010/main" xmlns="" w="9525">
                   <a:solidFill>
                     <a:srgbClr val="000000"/>
                   </a:solidFill>
@@ -3855,7 +3855,7 @@
             </a:ln>
             <a:extLst>
               <a:ext uri="{91240B29-F687-4f45-9708-019B960494DF}">
-                <a14:hiddenLine xmlns="" xmlns:a14="http://schemas.microsoft.com/office/drawing/2010/main" w="9525">
+                <a14:hiddenLine xmlns:a14="http://schemas.microsoft.com/office/drawing/2010/main" xmlns="" w="9525">
                   <a:solidFill>
                     <a:srgbClr val="000000"/>
                   </a:solidFill>
@@ -3917,7 +3917,7 @@
             </a:ln>
             <a:extLst>
               <a:ext uri="{91240B29-F687-4f45-9708-019B960494DF}">
-                <a14:hiddenLine xmlns="" xmlns:a14="http://schemas.microsoft.com/office/drawing/2010/main" w="9525">
+                <a14:hiddenLine xmlns:a14="http://schemas.microsoft.com/office/drawing/2010/main" xmlns="" w="9525">
                   <a:solidFill>
                     <a:srgbClr val="000000"/>
                   </a:solidFill>
@@ -4007,7 +4007,7 @@
             </a:ln>
             <a:extLst>
               <a:ext uri="{91240B29-F687-4f45-9708-019B960494DF}">
-                <a14:hiddenLine xmlns="" xmlns:a14="http://schemas.microsoft.com/office/drawing/2010/main" w="9525">
+                <a14:hiddenLine xmlns:a14="http://schemas.microsoft.com/office/drawing/2010/main" xmlns="" w="9525">
                   <a:solidFill>
                     <a:srgbClr val="000000"/>
                   </a:solidFill>
@@ -4097,7 +4097,7 @@
             </a:ln>
             <a:extLst>
               <a:ext uri="{91240B29-F687-4f45-9708-019B960494DF}">
-                <a14:hiddenLine xmlns="" xmlns:a14="http://schemas.microsoft.com/office/drawing/2010/main" w="9525">
+                <a14:hiddenLine xmlns:a14="http://schemas.microsoft.com/office/drawing/2010/main" xmlns="" w="9525">
                   <a:solidFill>
                     <a:srgbClr val="000000"/>
                   </a:solidFill>
@@ -4159,7 +4159,7 @@
             </a:ln>
             <a:extLst>
               <a:ext uri="{91240B29-F687-4f45-9708-019B960494DF}">
-                <a14:hiddenLine xmlns="" xmlns:a14="http://schemas.microsoft.com/office/drawing/2010/main" w="9525">
+                <a14:hiddenLine xmlns:a14="http://schemas.microsoft.com/office/drawing/2010/main" xmlns="" w="9525">
                   <a:solidFill>
                     <a:srgbClr val="000000"/>
                   </a:solidFill>
@@ -4249,7 +4249,7 @@
             </a:ln>
             <a:extLst>
               <a:ext uri="{91240B29-F687-4f45-9708-019B960494DF}">
-                <a14:hiddenLine xmlns="" xmlns:a14="http://schemas.microsoft.com/office/drawing/2010/main" w="9525">
+                <a14:hiddenLine xmlns:a14="http://schemas.microsoft.com/office/drawing/2010/main" xmlns="" w="9525">
                   <a:solidFill>
                     <a:srgbClr val="000000"/>
                   </a:solidFill>
@@ -4339,7 +4339,7 @@
             </a:ln>
             <a:extLst>
               <a:ext uri="{91240B29-F687-4f45-9708-019B960494DF}">
-                <a14:hiddenLine xmlns="" xmlns:a14="http://schemas.microsoft.com/office/drawing/2010/main" w="9525">
+                <a14:hiddenLine xmlns:a14="http://schemas.microsoft.com/office/drawing/2010/main" xmlns="" w="9525">
                   <a:solidFill>
                     <a:srgbClr val="000000"/>
                   </a:solidFill>
@@ -4395,7 +4395,7 @@
             </a:ln>
             <a:extLst>
               <a:ext uri="{91240B29-F687-4f45-9708-019B960494DF}">
-                <a14:hiddenLine xmlns="" xmlns:a14="http://schemas.microsoft.com/office/drawing/2010/main" w="9525">
+                <a14:hiddenLine xmlns:a14="http://schemas.microsoft.com/office/drawing/2010/main" xmlns="" w="9525">
                   <a:solidFill>
                     <a:srgbClr val="000000"/>
                   </a:solidFill>
@@ -4485,7 +4485,7 @@
             </a:ln>
             <a:extLst>
               <a:ext uri="{91240B29-F687-4f45-9708-019B960494DF}">
-                <a14:hiddenLine xmlns="" xmlns:a14="http://schemas.microsoft.com/office/drawing/2010/main" w="9525">
+                <a14:hiddenLine xmlns:a14="http://schemas.microsoft.com/office/drawing/2010/main" xmlns="" w="9525">
                   <a:solidFill>
                     <a:srgbClr val="000000"/>
                   </a:solidFill>
@@ -4541,7 +4541,7 @@
             </a:ln>
             <a:extLst>
               <a:ext uri="{91240B29-F687-4f45-9708-019B960494DF}">
-                <a14:hiddenLine xmlns="" xmlns:a14="http://schemas.microsoft.com/office/drawing/2010/main" w="9525">
+                <a14:hiddenLine xmlns:a14="http://schemas.microsoft.com/office/drawing/2010/main" xmlns="" w="9525">
                   <a:solidFill>
                     <a:srgbClr val="000000"/>
                   </a:solidFill>
@@ -4631,7 +4631,7 @@
             </a:ln>
             <a:extLst>
               <a:ext uri="{91240B29-F687-4f45-9708-019B960494DF}">
-                <a14:hiddenLine xmlns="" xmlns:a14="http://schemas.microsoft.com/office/drawing/2010/main" w="9525">
+                <a14:hiddenLine xmlns:a14="http://schemas.microsoft.com/office/drawing/2010/main" xmlns="" w="9525">
                   <a:solidFill>
                     <a:srgbClr val="000000"/>
                   </a:solidFill>
@@ -4699,7 +4699,7 @@
             </a:ln>
             <a:extLst>
               <a:ext uri="{91240B29-F687-4f45-9708-019B960494DF}">
-                <a14:hiddenLine xmlns="" xmlns:a14="http://schemas.microsoft.com/office/drawing/2010/main" w="9525">
+                <a14:hiddenLine xmlns:a14="http://schemas.microsoft.com/office/drawing/2010/main" xmlns="" w="9525">
                   <a:solidFill>
                     <a:srgbClr val="000000"/>
                   </a:solidFill>
@@ -4789,7 +4789,7 @@
             </a:ln>
             <a:extLst>
               <a:ext uri="{91240B29-F687-4f45-9708-019B960494DF}">
-                <a14:hiddenLine xmlns="" xmlns:a14="http://schemas.microsoft.com/office/drawing/2010/main" w="9525">
+                <a14:hiddenLine xmlns:a14="http://schemas.microsoft.com/office/drawing/2010/main" xmlns="" w="9525">
                   <a:solidFill>
                     <a:srgbClr val="000000"/>
                   </a:solidFill>
@@ -4857,7 +4857,7 @@
             </a:ln>
             <a:extLst>
               <a:ext uri="{91240B29-F687-4f45-9708-019B960494DF}">
-                <a14:hiddenLine xmlns="" xmlns:a14="http://schemas.microsoft.com/office/drawing/2010/main" w="9525">
+                <a14:hiddenLine xmlns:a14="http://schemas.microsoft.com/office/drawing/2010/main" xmlns="" w="9525">
                   <a:solidFill>
                     <a:srgbClr val="000000"/>
                   </a:solidFill>
@@ -4947,7 +4947,7 @@
             </a:ln>
             <a:extLst>
               <a:ext uri="{91240B29-F687-4f45-9708-019B960494DF}">
-                <a14:hiddenLine xmlns="" xmlns:a14="http://schemas.microsoft.com/office/drawing/2010/main" w="9525">
+                <a14:hiddenLine xmlns:a14="http://schemas.microsoft.com/office/drawing/2010/main" xmlns="" w="9525">
                   <a:solidFill>
                     <a:srgbClr val="000000"/>
                   </a:solidFill>
@@ -4981,7 +4981,7 @@
             </a:ln>
             <a:extLst>
               <a:ext uri="{91240B29-F687-4f45-9708-019B960494DF}">
-                <a14:hiddenLine xmlns="" xmlns:a14="http://schemas.microsoft.com/office/drawing/2010/main" w="9525">
+                <a14:hiddenLine xmlns:a14="http://schemas.microsoft.com/office/drawing/2010/main" xmlns="" w="9525">
                   <a:solidFill>
                     <a:srgbClr val="000000"/>
                   </a:solidFill>
@@ -5071,7 +5071,7 @@
             </a:ln>
             <a:extLst>
               <a:ext uri="{91240B29-F687-4f45-9708-019B960494DF}">
-                <a14:hiddenLine xmlns="" xmlns:a14="http://schemas.microsoft.com/office/drawing/2010/main" w="9525">
+                <a14:hiddenLine xmlns:a14="http://schemas.microsoft.com/office/drawing/2010/main" xmlns="" w="9525">
                   <a:solidFill>
                     <a:srgbClr val="000000"/>
                   </a:solidFill>
@@ -5133,7 +5133,7 @@
             </a:ln>
             <a:extLst>
               <a:ext uri="{91240B29-F687-4f45-9708-019B960494DF}">
-                <a14:hiddenLine xmlns="" xmlns:a14="http://schemas.microsoft.com/office/drawing/2010/main" w="9525">
+                <a14:hiddenLine xmlns:a14="http://schemas.microsoft.com/office/drawing/2010/main" xmlns="" w="9525">
                   <a:solidFill>
                     <a:srgbClr val="000000"/>
                   </a:solidFill>
@@ -5195,7 +5195,7 @@
             </a:ln>
             <a:extLst>
               <a:ext uri="{91240B29-F687-4f45-9708-019B960494DF}">
-                <a14:hiddenLine xmlns="" xmlns:a14="http://schemas.microsoft.com/office/drawing/2010/main" w="9525">
+                <a14:hiddenLine xmlns:a14="http://schemas.microsoft.com/office/drawing/2010/main" xmlns="" w="9525">
                   <a:solidFill>
                     <a:srgbClr val="000000"/>
                   </a:solidFill>
@@ -5285,7 +5285,7 @@
             </a:ln>
             <a:extLst>
               <a:ext uri="{91240B29-F687-4f45-9708-019B960494DF}">
-                <a14:hiddenLine xmlns="" xmlns:a14="http://schemas.microsoft.com/office/drawing/2010/main" w="9525">
+                <a14:hiddenLine xmlns:a14="http://schemas.microsoft.com/office/drawing/2010/main" xmlns="" w="9525">
                   <a:solidFill>
                     <a:srgbClr val="000000"/>
                   </a:solidFill>
@@ -5353,7 +5353,7 @@
             </a:ln>
             <a:extLst>
               <a:ext uri="{91240B29-F687-4f45-9708-019B960494DF}">
-                <a14:hiddenLine xmlns="" xmlns:a14="http://schemas.microsoft.com/office/drawing/2010/main" w="9525">
+                <a14:hiddenLine xmlns:a14="http://schemas.microsoft.com/office/drawing/2010/main" xmlns="" w="9525">
                   <a:solidFill>
                     <a:srgbClr val="000000"/>
                   </a:solidFill>
@@ -5415,7 +5415,7 @@
             </a:ln>
             <a:extLst>
               <a:ext uri="{91240B29-F687-4f45-9708-019B960494DF}">
-                <a14:hiddenLine xmlns="" xmlns:a14="http://schemas.microsoft.com/office/drawing/2010/main" w="9525">
+                <a14:hiddenLine xmlns:a14="http://schemas.microsoft.com/office/drawing/2010/main" xmlns="" w="9525">
                   <a:solidFill>
                     <a:srgbClr val="000000"/>
                   </a:solidFill>
@@ -5505,7 +5505,7 @@
             </a:ln>
             <a:extLst>
               <a:ext uri="{91240B29-F687-4f45-9708-019B960494DF}">
-                <a14:hiddenLine xmlns="" xmlns:a14="http://schemas.microsoft.com/office/drawing/2010/main" w="9525">
+                <a14:hiddenLine xmlns:a14="http://schemas.microsoft.com/office/drawing/2010/main" xmlns="" w="9525">
                   <a:solidFill>
                     <a:srgbClr val="000000"/>
                   </a:solidFill>
@@ -5567,7 +5567,7 @@
             </a:ln>
             <a:extLst>
               <a:ext uri="{91240B29-F687-4f45-9708-019B960494DF}">
-                <a14:hiddenLine xmlns="" xmlns:a14="http://schemas.microsoft.com/office/drawing/2010/main" w="9525">
+                <a14:hiddenLine xmlns:a14="http://schemas.microsoft.com/office/drawing/2010/main" xmlns="" w="9525">
                   <a:solidFill>
                     <a:srgbClr val="000000"/>
                   </a:solidFill>
@@ -5657,7 +5657,7 @@
             </a:ln>
             <a:extLst>
               <a:ext uri="{91240B29-F687-4f45-9708-019B960494DF}">
-                <a14:hiddenLine xmlns="" xmlns:a14="http://schemas.microsoft.com/office/drawing/2010/main" w="9525">
+                <a14:hiddenLine xmlns:a14="http://schemas.microsoft.com/office/drawing/2010/main" xmlns="" w="9525">
                   <a:solidFill>
                     <a:srgbClr val="000000"/>
                   </a:solidFill>
@@ -5719,7 +5719,7 @@
             </a:ln>
             <a:extLst>
               <a:ext uri="{91240B29-F687-4f45-9708-019B960494DF}">
-                <a14:hiddenLine xmlns="" xmlns:a14="http://schemas.microsoft.com/office/drawing/2010/main" w="9525">
+                <a14:hiddenLine xmlns:a14="http://schemas.microsoft.com/office/drawing/2010/main" xmlns="" w="9525">
                   <a:solidFill>
                     <a:srgbClr val="000000"/>
                   </a:solidFill>
@@ -5809,7 +5809,7 @@
             </a:ln>
             <a:extLst>
               <a:ext uri="{91240B29-F687-4f45-9708-019B960494DF}">
-                <a14:hiddenLine xmlns="" xmlns:a14="http://schemas.microsoft.com/office/drawing/2010/main" w="9525">
+                <a14:hiddenLine xmlns:a14="http://schemas.microsoft.com/office/drawing/2010/main" xmlns="" w="9525">
                   <a:solidFill>
                     <a:srgbClr val="000000"/>
                   </a:solidFill>
@@ -5843,7 +5843,7 @@
             </a:ln>
             <a:extLst>
               <a:ext uri="{91240B29-F687-4f45-9708-019B960494DF}">
-                <a14:hiddenLine xmlns="" xmlns:a14="http://schemas.microsoft.com/office/drawing/2010/main" w="9525">
+                <a14:hiddenLine xmlns:a14="http://schemas.microsoft.com/office/drawing/2010/main" xmlns="" w="9525">
                   <a:solidFill>
                     <a:srgbClr val="000000"/>
                   </a:solidFill>
@@ -5908,7 +5908,7 @@
             </a:ln>
             <a:extLst>
               <a:ext uri="{91240B29-F687-4f45-9708-019B960494DF}">
-                <a14:hiddenLine xmlns="" xmlns:a14="http://schemas.microsoft.com/office/drawing/2010/main" w="9525">
+                <a14:hiddenLine xmlns:a14="http://schemas.microsoft.com/office/drawing/2010/main" xmlns="" w="9525">
                   <a:solidFill>
                     <a:srgbClr val="000000"/>
                   </a:solidFill>
@@ -5998,7 +5998,7 @@
             </a:ln>
             <a:extLst>
               <a:ext uri="{91240B29-F687-4f45-9708-019B960494DF}">
-                <a14:hiddenLine xmlns="" xmlns:a14="http://schemas.microsoft.com/office/drawing/2010/main" w="9525">
+                <a14:hiddenLine xmlns:a14="http://schemas.microsoft.com/office/drawing/2010/main" xmlns="" w="9525">
                   <a:solidFill>
                     <a:srgbClr val="000000"/>
                   </a:solidFill>
@@ -6060,7 +6060,7 @@
             </a:ln>
             <a:extLst>
               <a:ext uri="{91240B29-F687-4f45-9708-019B960494DF}">
-                <a14:hiddenLine xmlns="" xmlns:a14="http://schemas.microsoft.com/office/drawing/2010/main" w="9525">
+                <a14:hiddenLine xmlns:a14="http://schemas.microsoft.com/office/drawing/2010/main" xmlns="" w="9525">
                   <a:solidFill>
                     <a:srgbClr val="000000"/>
                   </a:solidFill>
@@ -6150,7 +6150,7 @@
             </a:ln>
             <a:extLst>
               <a:ext uri="{91240B29-F687-4f45-9708-019B960494DF}">
-                <a14:hiddenLine xmlns="" xmlns:a14="http://schemas.microsoft.com/office/drawing/2010/main" w="9525">
+                <a14:hiddenLine xmlns:a14="http://schemas.microsoft.com/office/drawing/2010/main" xmlns="" w="9525">
                   <a:solidFill>
                     <a:srgbClr val="000000"/>
                   </a:solidFill>
@@ -6240,7 +6240,7 @@
             </a:ln>
             <a:extLst>
               <a:ext uri="{91240B29-F687-4f45-9708-019B960494DF}">
-                <a14:hiddenLine xmlns="" xmlns:a14="http://schemas.microsoft.com/office/drawing/2010/main" w="9525">
+                <a14:hiddenLine xmlns:a14="http://schemas.microsoft.com/office/drawing/2010/main" xmlns="" w="9525">
                   <a:solidFill>
                     <a:srgbClr val="000000"/>
                   </a:solidFill>
@@ -6305,7 +6305,7 @@
             </a:ln>
             <a:extLst>
               <a:ext uri="{91240B29-F687-4f45-9708-019B960494DF}">
-                <a14:hiddenLine xmlns="" xmlns:a14="http://schemas.microsoft.com/office/drawing/2010/main" w="9525">
+                <a14:hiddenLine xmlns:a14="http://schemas.microsoft.com/office/drawing/2010/main" xmlns="" w="9525">
                   <a:solidFill>
                     <a:srgbClr val="000000"/>
                   </a:solidFill>
@@ -6367,7 +6367,7 @@
             </a:ln>
             <a:extLst>
               <a:ext uri="{91240B29-F687-4f45-9708-019B960494DF}">
-                <a14:hiddenLine xmlns="" xmlns:a14="http://schemas.microsoft.com/office/drawing/2010/main" w="9525">
+                <a14:hiddenLine xmlns:a14="http://schemas.microsoft.com/office/drawing/2010/main" xmlns="" w="9525">
                   <a:solidFill>
                     <a:srgbClr val="000000"/>
                   </a:solidFill>
@@ -6457,7 +6457,7 @@
             </a:ln>
             <a:extLst>
               <a:ext uri="{91240B29-F687-4f45-9708-019B960494DF}">
-                <a14:hiddenLine xmlns="" xmlns:a14="http://schemas.microsoft.com/office/drawing/2010/main" w="9525">
+                <a14:hiddenLine xmlns:a14="http://schemas.microsoft.com/office/drawing/2010/main" xmlns="" w="9525">
                   <a:solidFill>
                     <a:srgbClr val="000000"/>
                   </a:solidFill>
@@ -6547,7 +6547,7 @@
             </a:ln>
             <a:extLst>
               <a:ext uri="{91240B29-F687-4f45-9708-019B960494DF}">
-                <a14:hiddenLine xmlns="" xmlns:a14="http://schemas.microsoft.com/office/drawing/2010/main" w="9525">
+                <a14:hiddenLine xmlns:a14="http://schemas.microsoft.com/office/drawing/2010/main" xmlns="" w="9525">
                   <a:solidFill>
                     <a:srgbClr val="000000"/>
                   </a:solidFill>
@@ -6609,7 +6609,7 @@
             </a:ln>
             <a:extLst>
               <a:ext uri="{91240B29-F687-4f45-9708-019B960494DF}">
-                <a14:hiddenLine xmlns="" xmlns:a14="http://schemas.microsoft.com/office/drawing/2010/main" w="9525">
+                <a14:hiddenLine xmlns:a14="http://schemas.microsoft.com/office/drawing/2010/main" xmlns="" w="9525">
                   <a:solidFill>
                     <a:srgbClr val="000000"/>
                   </a:solidFill>
@@ -6729,7 +6729,7 @@
             </a:ln>
             <a:extLst>
               <a:ext uri="{91240B29-F687-4f45-9708-019B960494DF}">
-                <a14:hiddenLine xmlns="" xmlns:a14="http://schemas.microsoft.com/office/drawing/2010/main" w="9525">
+                <a14:hiddenLine xmlns:a14="http://schemas.microsoft.com/office/drawing/2010/main" xmlns="" w="9525">
                   <a:solidFill>
                     <a:srgbClr val="000000"/>
                   </a:solidFill>
@@ -6797,7 +6797,7 @@
             </a:ln>
             <a:extLst>
               <a:ext uri="{91240B29-F687-4f45-9708-019B960494DF}">
-                <a14:hiddenLine xmlns="" xmlns:a14="http://schemas.microsoft.com/office/drawing/2010/main" w="9525">
+                <a14:hiddenLine xmlns:a14="http://schemas.microsoft.com/office/drawing/2010/main" xmlns="" w="9525">
                   <a:solidFill>
                     <a:srgbClr val="000000"/>
                   </a:solidFill>
@@ -6887,7 +6887,7 @@
             </a:ln>
             <a:extLst>
               <a:ext uri="{91240B29-F687-4f45-9708-019B960494DF}">
-                <a14:hiddenLine xmlns="" xmlns:a14="http://schemas.microsoft.com/office/drawing/2010/main" w="9525">
+                <a14:hiddenLine xmlns:a14="http://schemas.microsoft.com/office/drawing/2010/main" xmlns="" w="9525">
                   <a:solidFill>
                     <a:srgbClr val="000000"/>
                   </a:solidFill>
@@ -7027,7 +7027,7 @@
           <a:p>
             <a:fld id="{D53C38B0-4F3C-49B8-8CAC-02B41E069EF2}" type="datetimeFigureOut">
               <a:rPr lang="es-ES" smtClean="0"/>
-              <a:t>22/09/2021</a:t>
+              <a:t>14/10/2021</a:t>
             </a:fld>
             <a:endParaRPr lang="es-ES"/>
           </a:p>
@@ -7294,7 +7294,7 @@
           <a:p>
             <a:fld id="{D53C38B0-4F3C-49B8-8CAC-02B41E069EF2}" type="datetimeFigureOut">
               <a:rPr lang="es-ES" smtClean="0"/>
-              <a:t>22/09/2021</a:t>
+              <a:t>14/10/2021</a:t>
             </a:fld>
             <a:endParaRPr lang="es-ES"/>
           </a:p>
@@ -7490,7 +7490,7 @@
           <a:p>
             <a:fld id="{D53C38B0-4F3C-49B8-8CAC-02B41E069EF2}" type="datetimeFigureOut">
               <a:rPr lang="es-ES" smtClean="0"/>
-              <a:t>22/09/2021</a:t>
+              <a:t>14/10/2021</a:t>
             </a:fld>
             <a:endParaRPr lang="es-ES"/>
           </a:p>
@@ -7753,7 +7753,7 @@
           <a:p>
             <a:fld id="{D53C38B0-4F3C-49B8-8CAC-02B41E069EF2}" type="datetimeFigureOut">
               <a:rPr lang="es-ES" smtClean="0"/>
-              <a:t>22/09/2021</a:t>
+              <a:t>14/10/2021</a:t>
             </a:fld>
             <a:endParaRPr lang="es-ES"/>
           </a:p>
@@ -8187,7 +8187,7 @@
           <a:p>
             <a:fld id="{D53C38B0-4F3C-49B8-8CAC-02B41E069EF2}" type="datetimeFigureOut">
               <a:rPr lang="es-ES" smtClean="0"/>
-              <a:t>22/09/2021</a:t>
+              <a:t>14/10/2021</a:t>
             </a:fld>
             <a:endParaRPr lang="es-ES"/>
           </a:p>
@@ -8733,7 +8733,7 @@
           <a:p>
             <a:fld id="{D53C38B0-4F3C-49B8-8CAC-02B41E069EF2}" type="datetimeFigureOut">
               <a:rPr lang="es-ES" smtClean="0"/>
-              <a:t>22/09/2021</a:t>
+              <a:t>14/10/2021</a:t>
             </a:fld>
             <a:endParaRPr lang="es-ES"/>
           </a:p>
@@ -9453,7 +9453,7 @@
           <a:p>
             <a:fld id="{D53C38B0-4F3C-49B8-8CAC-02B41E069EF2}" type="datetimeFigureOut">
               <a:rPr lang="es-ES" smtClean="0"/>
-              <a:t>22/09/2021</a:t>
+              <a:t>14/10/2021</a:t>
             </a:fld>
             <a:endParaRPr lang="es-ES"/>
           </a:p>
@@ -9623,7 +9623,7 @@
           <a:p>
             <a:fld id="{D53C38B0-4F3C-49B8-8CAC-02B41E069EF2}" type="datetimeFigureOut">
               <a:rPr lang="es-ES" smtClean="0"/>
-              <a:t>22/09/2021</a:t>
+              <a:t>14/10/2021</a:t>
             </a:fld>
             <a:endParaRPr lang="es-ES"/>
           </a:p>
@@ -9803,7 +9803,7 @@
           <a:p>
             <a:fld id="{D53C38B0-4F3C-49B8-8CAC-02B41E069EF2}" type="datetimeFigureOut">
               <a:rPr lang="es-ES" smtClean="0"/>
-              <a:t>22/09/2021</a:t>
+              <a:t>14/10/2021</a:t>
             </a:fld>
             <a:endParaRPr lang="es-ES"/>
           </a:p>
@@ -9973,7 +9973,7 @@
           <a:p>
             <a:fld id="{D53C38B0-4F3C-49B8-8CAC-02B41E069EF2}" type="datetimeFigureOut">
               <a:rPr lang="es-ES" smtClean="0"/>
-              <a:t>22/09/2021</a:t>
+              <a:t>14/10/2021</a:t>
             </a:fld>
             <a:endParaRPr lang="es-ES"/>
           </a:p>
@@ -10223,7 +10223,7 @@
           <a:p>
             <a:fld id="{D53C38B0-4F3C-49B8-8CAC-02B41E069EF2}" type="datetimeFigureOut">
               <a:rPr lang="es-ES" smtClean="0"/>
-              <a:t>22/09/2021</a:t>
+              <a:t>14/10/2021</a:t>
             </a:fld>
             <a:endParaRPr lang="es-ES"/>
           </a:p>
@@ -10455,7 +10455,7 @@
           <a:p>
             <a:fld id="{D53C38B0-4F3C-49B8-8CAC-02B41E069EF2}" type="datetimeFigureOut">
               <a:rPr lang="es-ES" smtClean="0"/>
-              <a:t>22/09/2021</a:t>
+              <a:t>14/10/2021</a:t>
             </a:fld>
             <a:endParaRPr lang="es-ES"/>
           </a:p>
@@ -10836,7 +10836,7 @@
           <a:p>
             <a:fld id="{D53C38B0-4F3C-49B8-8CAC-02B41E069EF2}" type="datetimeFigureOut">
               <a:rPr lang="es-ES" smtClean="0"/>
-              <a:t>22/09/2021</a:t>
+              <a:t>14/10/2021</a:t>
             </a:fld>
             <a:endParaRPr lang="es-ES"/>
           </a:p>
@@ -10954,7 +10954,7 @@
           <a:p>
             <a:fld id="{D53C38B0-4F3C-49B8-8CAC-02B41E069EF2}" type="datetimeFigureOut">
               <a:rPr lang="es-ES" smtClean="0"/>
-              <a:t>22/09/2021</a:t>
+              <a:t>14/10/2021</a:t>
             </a:fld>
             <a:endParaRPr lang="es-ES"/>
           </a:p>
@@ -11049,7 +11049,7 @@
           <a:p>
             <a:fld id="{D53C38B0-4F3C-49B8-8CAC-02B41E069EF2}" type="datetimeFigureOut">
               <a:rPr lang="es-ES" smtClean="0"/>
-              <a:t>22/09/2021</a:t>
+              <a:t>14/10/2021</a:t>
             </a:fld>
             <a:endParaRPr lang="es-ES"/>
           </a:p>
@@ -11298,7 +11298,7 @@
           <a:p>
             <a:fld id="{D53C38B0-4F3C-49B8-8CAC-02B41E069EF2}" type="datetimeFigureOut">
               <a:rPr lang="es-ES" smtClean="0"/>
-              <a:t>22/09/2021</a:t>
+              <a:t>14/10/2021</a:t>
             </a:fld>
             <a:endParaRPr lang="es-ES"/>
           </a:p>
@@ -11578,7 +11578,7 @@
           <a:p>
             <a:fld id="{D53C38B0-4F3C-49B8-8CAC-02B41E069EF2}" type="datetimeFigureOut">
               <a:rPr lang="es-ES" smtClean="0"/>
-              <a:t>22/09/2021</a:t>
+              <a:t>14/10/2021</a:t>
             </a:fld>
             <a:endParaRPr lang="es-ES"/>
           </a:p>
@@ -11694,7 +11694,7 @@
           <a:noFill/>
           <a:extLst>
             <a:ext uri="{909E8E84-426E-40dd-AFC4-6F175D3DCCD1}">
-              <a14:hiddenFill xmlns="" xmlns:a14="http://schemas.microsoft.com/office/drawing/2010/main">
+              <a14:hiddenFill xmlns:a14="http://schemas.microsoft.com/office/drawing/2010/main" xmlns="">
                 <a:solidFill>
                   <a:srgbClr val="FFFFFF"/>
                 </a:solidFill>
@@ -11768,7 +11768,7 @@
               </a:ln>
               <a:extLst>
                 <a:ext uri="{91240B29-F687-4f45-9708-019B960494DF}">
-                  <a14:hiddenLine xmlns="" xmlns:a14="http://schemas.microsoft.com/office/drawing/2010/main" w="9525">
+                  <a14:hiddenLine xmlns:a14="http://schemas.microsoft.com/office/drawing/2010/main" xmlns="" w="9525">
                     <a:solidFill>
                       <a:srgbClr val="000000"/>
                     </a:solidFill>
@@ -11858,7 +11858,7 @@
               </a:ln>
               <a:extLst>
                 <a:ext uri="{91240B29-F687-4f45-9708-019B960494DF}">
-                  <a14:hiddenLine xmlns="" xmlns:a14="http://schemas.microsoft.com/office/drawing/2010/main" w="9525">
+                  <a14:hiddenLine xmlns:a14="http://schemas.microsoft.com/office/drawing/2010/main" xmlns="" w="9525">
                     <a:solidFill>
                       <a:srgbClr val="000000"/>
                     </a:solidFill>
@@ -11948,7 +11948,7 @@
               </a:ln>
               <a:extLst>
                 <a:ext uri="{91240B29-F687-4f45-9708-019B960494DF}">
-                  <a14:hiddenLine xmlns="" xmlns:a14="http://schemas.microsoft.com/office/drawing/2010/main" w="9525">
+                  <a14:hiddenLine xmlns:a14="http://schemas.microsoft.com/office/drawing/2010/main" xmlns="" w="9525">
                     <a:solidFill>
                       <a:srgbClr val="000000"/>
                     </a:solidFill>
@@ -12010,7 +12010,7 @@
               </a:ln>
               <a:extLst>
                 <a:ext uri="{91240B29-F687-4f45-9708-019B960494DF}">
-                  <a14:hiddenLine xmlns="" xmlns:a14="http://schemas.microsoft.com/office/drawing/2010/main" w="9525">
+                  <a14:hiddenLine xmlns:a14="http://schemas.microsoft.com/office/drawing/2010/main" xmlns="" w="9525">
                     <a:solidFill>
                       <a:srgbClr val="000000"/>
                     </a:solidFill>
@@ -12100,7 +12100,7 @@
               </a:ln>
               <a:extLst>
                 <a:ext uri="{91240B29-F687-4f45-9708-019B960494DF}">
-                  <a14:hiddenLine xmlns="" xmlns:a14="http://schemas.microsoft.com/office/drawing/2010/main" w="9525">
+                  <a14:hiddenLine xmlns:a14="http://schemas.microsoft.com/office/drawing/2010/main" xmlns="" w="9525">
                     <a:solidFill>
                       <a:srgbClr val="000000"/>
                     </a:solidFill>
@@ -12162,7 +12162,7 @@
               </a:ln>
               <a:extLst>
                 <a:ext uri="{91240B29-F687-4f45-9708-019B960494DF}">
-                  <a14:hiddenLine xmlns="" xmlns:a14="http://schemas.microsoft.com/office/drawing/2010/main" w="9525">
+                  <a14:hiddenLine xmlns:a14="http://schemas.microsoft.com/office/drawing/2010/main" xmlns="" w="9525">
                     <a:solidFill>
                       <a:srgbClr val="000000"/>
                     </a:solidFill>
@@ -12224,7 +12224,7 @@
               </a:ln>
               <a:extLst>
                 <a:ext uri="{91240B29-F687-4f45-9708-019B960494DF}">
-                  <a14:hiddenLine xmlns="" xmlns:a14="http://schemas.microsoft.com/office/drawing/2010/main" w="9525">
+                  <a14:hiddenLine xmlns:a14="http://schemas.microsoft.com/office/drawing/2010/main" xmlns="" w="9525">
                     <a:solidFill>
                       <a:srgbClr val="000000"/>
                     </a:solidFill>
@@ -12314,7 +12314,7 @@
               </a:ln>
               <a:extLst>
                 <a:ext uri="{91240B29-F687-4f45-9708-019B960494DF}">
-                  <a14:hiddenLine xmlns="" xmlns:a14="http://schemas.microsoft.com/office/drawing/2010/main" w="9525">
+                  <a14:hiddenLine xmlns:a14="http://schemas.microsoft.com/office/drawing/2010/main" xmlns="" w="9525">
                     <a:solidFill>
                       <a:srgbClr val="000000"/>
                     </a:solidFill>
@@ -12404,7 +12404,7 @@
               </a:ln>
               <a:extLst>
                 <a:ext uri="{91240B29-F687-4f45-9708-019B960494DF}">
-                  <a14:hiddenLine xmlns="" xmlns:a14="http://schemas.microsoft.com/office/drawing/2010/main" w="9525">
+                  <a14:hiddenLine xmlns:a14="http://schemas.microsoft.com/office/drawing/2010/main" xmlns="" w="9525">
                     <a:solidFill>
                       <a:srgbClr val="000000"/>
                     </a:solidFill>
@@ -12466,7 +12466,7 @@
               </a:ln>
               <a:extLst>
                 <a:ext uri="{91240B29-F687-4f45-9708-019B960494DF}">
-                  <a14:hiddenLine xmlns="" xmlns:a14="http://schemas.microsoft.com/office/drawing/2010/main" w="9525">
+                  <a14:hiddenLine xmlns:a14="http://schemas.microsoft.com/office/drawing/2010/main" xmlns="" w="9525">
                     <a:solidFill>
                       <a:srgbClr val="000000"/>
                     </a:solidFill>
@@ -12576,7 +12576,7 @@
               </a:ln>
               <a:extLst>
                 <a:ext uri="{91240B29-F687-4f45-9708-019B960494DF}">
-                  <a14:hiddenLine xmlns="" xmlns:a14="http://schemas.microsoft.com/office/drawing/2010/main" w="9525">
+                  <a14:hiddenLine xmlns:a14="http://schemas.microsoft.com/office/drawing/2010/main" xmlns="" w="9525">
                     <a:solidFill>
                       <a:srgbClr val="000000"/>
                     </a:solidFill>
@@ -12660,7 +12660,7 @@
               </a:ln>
               <a:extLst>
                 <a:ext uri="{91240B29-F687-4f45-9708-019B960494DF}">
-                  <a14:hiddenLine xmlns="" xmlns:a14="http://schemas.microsoft.com/office/drawing/2010/main" w="9525">
+                  <a14:hiddenLine xmlns:a14="http://schemas.microsoft.com/office/drawing/2010/main" xmlns="" w="9525">
                     <a:solidFill>
                       <a:srgbClr val="000000"/>
                     </a:solidFill>
@@ -12722,7 +12722,7 @@
               </a:ln>
               <a:extLst>
                 <a:ext uri="{91240B29-F687-4f45-9708-019B960494DF}">
-                  <a14:hiddenLine xmlns="" xmlns:a14="http://schemas.microsoft.com/office/drawing/2010/main" w="9525">
+                  <a14:hiddenLine xmlns:a14="http://schemas.microsoft.com/office/drawing/2010/main" xmlns="" w="9525">
                     <a:solidFill>
                       <a:srgbClr val="000000"/>
                     </a:solidFill>
@@ -12784,7 +12784,7 @@
               </a:ln>
               <a:extLst>
                 <a:ext uri="{91240B29-F687-4f45-9708-019B960494DF}">
-                  <a14:hiddenLine xmlns="" xmlns:a14="http://schemas.microsoft.com/office/drawing/2010/main" w="9525">
+                  <a14:hiddenLine xmlns:a14="http://schemas.microsoft.com/office/drawing/2010/main" xmlns="" w="9525">
                     <a:solidFill>
                       <a:srgbClr val="000000"/>
                     </a:solidFill>
@@ -12874,7 +12874,7 @@
               </a:ln>
               <a:extLst>
                 <a:ext uri="{91240B29-F687-4f45-9708-019B960494DF}">
-                  <a14:hiddenLine xmlns="" xmlns:a14="http://schemas.microsoft.com/office/drawing/2010/main" w="9525">
+                  <a14:hiddenLine xmlns:a14="http://schemas.microsoft.com/office/drawing/2010/main" xmlns="" w="9525">
                     <a:solidFill>
                       <a:srgbClr val="000000"/>
                     </a:solidFill>
@@ -12908,7 +12908,7 @@
               </a:ln>
               <a:extLst>
                 <a:ext uri="{91240B29-F687-4f45-9708-019B960494DF}">
-                  <a14:hiddenLine xmlns="" xmlns:a14="http://schemas.microsoft.com/office/drawing/2010/main" w="9525">
+                  <a14:hiddenLine xmlns:a14="http://schemas.microsoft.com/office/drawing/2010/main" xmlns="" w="9525">
                     <a:solidFill>
                       <a:srgbClr val="000000"/>
                     </a:solidFill>
@@ -12973,7 +12973,7 @@
               </a:ln>
               <a:extLst>
                 <a:ext uri="{91240B29-F687-4f45-9708-019B960494DF}">
-                  <a14:hiddenLine xmlns="" xmlns:a14="http://schemas.microsoft.com/office/drawing/2010/main" w="9525">
+                  <a14:hiddenLine xmlns:a14="http://schemas.microsoft.com/office/drawing/2010/main" xmlns="" w="9525">
                     <a:solidFill>
                       <a:srgbClr val="000000"/>
                     </a:solidFill>
@@ -13063,7 +13063,7 @@
               </a:ln>
               <a:extLst>
                 <a:ext uri="{91240B29-F687-4f45-9708-019B960494DF}">
-                  <a14:hiddenLine xmlns="" xmlns:a14="http://schemas.microsoft.com/office/drawing/2010/main" w="9525">
+                  <a14:hiddenLine xmlns:a14="http://schemas.microsoft.com/office/drawing/2010/main" xmlns="" w="9525">
                     <a:solidFill>
                       <a:srgbClr val="000000"/>
                     </a:solidFill>
@@ -13125,7 +13125,7 @@
               </a:ln>
               <a:extLst>
                 <a:ext uri="{91240B29-F687-4f45-9708-019B960494DF}">
-                  <a14:hiddenLine xmlns="" xmlns:a14="http://schemas.microsoft.com/office/drawing/2010/main" w="9525">
+                  <a14:hiddenLine xmlns:a14="http://schemas.microsoft.com/office/drawing/2010/main" xmlns="" w="9525">
                     <a:solidFill>
                       <a:srgbClr val="000000"/>
                     </a:solidFill>
@@ -13215,7 +13215,7 @@
               </a:ln>
               <a:extLst>
                 <a:ext uri="{91240B29-F687-4f45-9708-019B960494DF}">
-                  <a14:hiddenLine xmlns="" xmlns:a14="http://schemas.microsoft.com/office/drawing/2010/main" w="9525">
+                  <a14:hiddenLine xmlns:a14="http://schemas.microsoft.com/office/drawing/2010/main" xmlns="" w="9525">
                     <a:solidFill>
                       <a:srgbClr val="000000"/>
                     </a:solidFill>
@@ -13280,7 +13280,7 @@
               </a:ln>
               <a:extLst>
                 <a:ext uri="{91240B29-F687-4f45-9708-019B960494DF}">
-                  <a14:hiddenLine xmlns="" xmlns:a14="http://schemas.microsoft.com/office/drawing/2010/main" w="9525">
+                  <a14:hiddenLine xmlns:a14="http://schemas.microsoft.com/office/drawing/2010/main" xmlns="" w="9525">
                     <a:solidFill>
                       <a:srgbClr val="000000"/>
                     </a:solidFill>
@@ -13342,7 +13342,7 @@
               </a:ln>
               <a:extLst>
                 <a:ext uri="{91240B29-F687-4f45-9708-019B960494DF}">
-                  <a14:hiddenLine xmlns="" xmlns:a14="http://schemas.microsoft.com/office/drawing/2010/main" w="9525">
+                  <a14:hiddenLine xmlns:a14="http://schemas.microsoft.com/office/drawing/2010/main" xmlns="" w="9525">
                     <a:solidFill>
                       <a:srgbClr val="000000"/>
                     </a:solidFill>
@@ -13432,7 +13432,7 @@
               </a:ln>
               <a:extLst>
                 <a:ext uri="{91240B29-F687-4f45-9708-019B960494DF}">
-                  <a14:hiddenLine xmlns="" xmlns:a14="http://schemas.microsoft.com/office/drawing/2010/main" w="9525">
+                  <a14:hiddenLine xmlns:a14="http://schemas.microsoft.com/office/drawing/2010/main" xmlns="" w="9525">
                     <a:solidFill>
                       <a:srgbClr val="000000"/>
                     </a:solidFill>
@@ -13522,7 +13522,7 @@
               </a:ln>
               <a:extLst>
                 <a:ext uri="{91240B29-F687-4f45-9708-019B960494DF}">
-                  <a14:hiddenLine xmlns="" xmlns:a14="http://schemas.microsoft.com/office/drawing/2010/main" w="9525">
+                  <a14:hiddenLine xmlns:a14="http://schemas.microsoft.com/office/drawing/2010/main" xmlns="" w="9525">
                     <a:solidFill>
                       <a:srgbClr val="000000"/>
                     </a:solidFill>
@@ -13587,7 +13587,7 @@
               </a:ln>
               <a:extLst>
                 <a:ext uri="{91240B29-F687-4f45-9708-019B960494DF}">
-                  <a14:hiddenLine xmlns="" xmlns:a14="http://schemas.microsoft.com/office/drawing/2010/main" w="9525">
+                  <a14:hiddenLine xmlns:a14="http://schemas.microsoft.com/office/drawing/2010/main" xmlns="" w="9525">
                     <a:solidFill>
                       <a:srgbClr val="000000"/>
                     </a:solidFill>
@@ -13707,7 +13707,7 @@
               </a:ln>
               <a:extLst>
                 <a:ext uri="{91240B29-F687-4f45-9708-019B960494DF}">
-                  <a14:hiddenLine xmlns="" xmlns:a14="http://schemas.microsoft.com/office/drawing/2010/main" w="9525">
+                  <a14:hiddenLine xmlns:a14="http://schemas.microsoft.com/office/drawing/2010/main" xmlns="" w="9525">
                     <a:solidFill>
                       <a:srgbClr val="000000"/>
                     </a:solidFill>
@@ -13805,7 +13805,7 @@
               </a:ln>
               <a:extLst>
                 <a:ext uri="{91240B29-F687-4f45-9708-019B960494DF}">
-                  <a14:hiddenLine xmlns="" xmlns:a14="http://schemas.microsoft.com/office/drawing/2010/main" w="9525">
+                  <a14:hiddenLine xmlns:a14="http://schemas.microsoft.com/office/drawing/2010/main" xmlns="" w="9525">
                     <a:solidFill>
                       <a:srgbClr val="000000"/>
                     </a:solidFill>
@@ -13920,7 +13920,7 @@
               </a:ln>
               <a:extLst>
                 <a:ext uri="{91240B29-F687-4f45-9708-019B960494DF}">
-                  <a14:hiddenLine xmlns="" xmlns:a14="http://schemas.microsoft.com/office/drawing/2010/main" w="9525">
+                  <a14:hiddenLine xmlns:a14="http://schemas.microsoft.com/office/drawing/2010/main" xmlns="" w="9525">
                     <a:solidFill>
                       <a:srgbClr val="000000"/>
                     </a:solidFill>
@@ -14010,7 +14010,7 @@
               </a:ln>
               <a:extLst>
                 <a:ext uri="{91240B29-F687-4f45-9708-019B960494DF}">
-                  <a14:hiddenLine xmlns="" xmlns:a14="http://schemas.microsoft.com/office/drawing/2010/main" w="9525">
+                  <a14:hiddenLine xmlns:a14="http://schemas.microsoft.com/office/drawing/2010/main" xmlns="" w="9525">
                     <a:solidFill>
                       <a:srgbClr val="000000"/>
                     </a:solidFill>
@@ -14075,7 +14075,7 @@
               </a:ln>
               <a:extLst>
                 <a:ext uri="{91240B29-F687-4f45-9708-019B960494DF}">
-                  <a14:hiddenLine xmlns="" xmlns:a14="http://schemas.microsoft.com/office/drawing/2010/main" w="9525">
+                  <a14:hiddenLine xmlns:a14="http://schemas.microsoft.com/office/drawing/2010/main" xmlns="" w="9525">
                     <a:solidFill>
                       <a:srgbClr val="000000"/>
                     </a:solidFill>
@@ -14165,7 +14165,7 @@
               </a:ln>
               <a:extLst>
                 <a:ext uri="{91240B29-F687-4f45-9708-019B960494DF}">
-                  <a14:hiddenLine xmlns="" xmlns:a14="http://schemas.microsoft.com/office/drawing/2010/main" w="9525">
+                  <a14:hiddenLine xmlns:a14="http://schemas.microsoft.com/office/drawing/2010/main" xmlns="" w="9525">
                     <a:solidFill>
                       <a:srgbClr val="000000"/>
                     </a:solidFill>
@@ -14233,7 +14233,7 @@
               </a:ln>
               <a:extLst>
                 <a:ext uri="{91240B29-F687-4f45-9708-019B960494DF}">
-                  <a14:hiddenLine xmlns="" xmlns:a14="http://schemas.microsoft.com/office/drawing/2010/main" w="9525">
+                  <a14:hiddenLine xmlns:a14="http://schemas.microsoft.com/office/drawing/2010/main" xmlns="" w="9525">
                     <a:solidFill>
                       <a:srgbClr val="000000"/>
                     </a:solidFill>
@@ -14323,7 +14323,7 @@
               </a:ln>
               <a:extLst>
                 <a:ext uri="{91240B29-F687-4f45-9708-019B960494DF}">
-                  <a14:hiddenLine xmlns="" xmlns:a14="http://schemas.microsoft.com/office/drawing/2010/main" w="9525">
+                  <a14:hiddenLine xmlns:a14="http://schemas.microsoft.com/office/drawing/2010/main" xmlns="" w="9525">
                     <a:solidFill>
                       <a:srgbClr val="000000"/>
                     </a:solidFill>
@@ -14391,7 +14391,7 @@
               </a:ln>
               <a:extLst>
                 <a:ext uri="{91240B29-F687-4f45-9708-019B960494DF}">
-                  <a14:hiddenLine xmlns="" xmlns:a14="http://schemas.microsoft.com/office/drawing/2010/main" w="9525">
+                  <a14:hiddenLine xmlns:a14="http://schemas.microsoft.com/office/drawing/2010/main" xmlns="" w="9525">
                     <a:solidFill>
                       <a:srgbClr val="000000"/>
                     </a:solidFill>
@@ -14481,7 +14481,7 @@
               </a:ln>
               <a:extLst>
                 <a:ext uri="{91240B29-F687-4f45-9708-019B960494DF}">
-                  <a14:hiddenLine xmlns="" xmlns:a14="http://schemas.microsoft.com/office/drawing/2010/main" w="9525">
+                  <a14:hiddenLine xmlns:a14="http://schemas.microsoft.com/office/drawing/2010/main" xmlns="" w="9525">
                     <a:solidFill>
                       <a:srgbClr val="000000"/>
                     </a:solidFill>
@@ -14515,7 +14515,7 @@
               </a:ln>
               <a:extLst>
                 <a:ext uri="{91240B29-F687-4f45-9708-019B960494DF}">
-                  <a14:hiddenLine xmlns="" xmlns:a14="http://schemas.microsoft.com/office/drawing/2010/main" w="9525">
+                  <a14:hiddenLine xmlns:a14="http://schemas.microsoft.com/office/drawing/2010/main" xmlns="" w="9525">
                     <a:solidFill>
                       <a:srgbClr val="000000"/>
                     </a:solidFill>
@@ -14655,7 +14655,7 @@
           <a:p>
             <a:fld id="{D53C38B0-4F3C-49B8-8CAC-02B41E069EF2}" type="datetimeFigureOut">
               <a:rPr lang="es-ES" smtClean="0"/>
-              <a:t>22/09/2021</a:t>
+              <a:t>14/10/2021</a:t>
             </a:fld>
             <a:endParaRPr lang="es-ES"/>
           </a:p>
@@ -15111,7 +15111,7 @@
                 </a:solidFill>
                 <a:latin typeface="Avenir Next" panose="020B0503020202020204" pitchFamily="34" charset="0"/>
               </a:rPr>
-              <a:t>Core Workshop 4</a:t>
+              <a:t>Core Workshop </a:t>
             </a:r>
             <a:r>
               <a:rPr lang="en-US" sz="3600" cap="none" dirty="0" smtClean="0">
@@ -15120,7 +15120,16 @@
                 </a:solidFill>
                 <a:latin typeface="Avenir Next" panose="020B0503020202020204" pitchFamily="34" charset="0"/>
               </a:rPr>
-              <a:t>: Polynomial Regression</a:t>
+              <a:t>3: </a:t>
+            </a:r>
+            <a:r>
+              <a:rPr lang="en-US" sz="3600" cap="none" dirty="0" smtClean="0">
+                <a:solidFill>
+                  <a:srgbClr val="000000"/>
+                </a:solidFill>
+                <a:latin typeface="Avenir Next" panose="020B0503020202020204" pitchFamily="34" charset="0"/>
+              </a:rPr>
+              <a:t>Polynomial Regression</a:t>
             </a:r>
             <a:endParaRPr lang="en-US" sz="3600" cap="none" dirty="0">
               <a:solidFill>

</xml_diff>